<commit_message>
adding book; adding notes in lecture file week 7
</commit_message>
<xml_diff>
--- a/lecture/7-Association_Rule.pptx
+++ b/lecture/7-Association_Rule.pptx
@@ -175,6 +175,22 @@
       </a:defRPr>
     </a:lvl9pPr>
   </p:defaultTextStyle>
+  <p:extLst>
+    <p:ext uri="{EFAFB233-063F-42B5-8137-9DF3F51BA10A}">
+      <p15:sldGuideLst xmlns:p15="http://schemas.microsoft.com/office/powerpoint/2012/main">
+        <p15:guide id="1" orient="horz" pos="2160">
+          <p15:clr>
+            <a:srgbClr val="A4A3A4"/>
+          </p15:clr>
+        </p15:guide>
+        <p15:guide id="2" pos="2880">
+          <p15:clr>
+            <a:srgbClr val="A4A3A4"/>
+          </p15:clr>
+        </p15:guide>
+      </p15:sldGuideLst>
+    </p:ext>
+  </p:extLst>
 </p:presentation>
 </file>
 
@@ -269,7 +285,7 @@
               <a:pPr>
                 <a:defRPr/>
               </a:pPr>
-              <a:t>2016/11/7</a:t>
+              <a:t>2016/12/15</a:t>
             </a:fld>
             <a:endParaRPr lang="zh-CN" altLang="en-US"/>
           </a:p>
@@ -576,6 +592,404 @@
     </a:lvl9pPr>
   </p:notesStyle>
 </p:notesMaster>
+</file>
+
+<file path=ppt/notesSlides/notesSlide1.xml><?xml version="1.0" encoding="utf-8"?>
+<p:notes xmlns:a="http://schemas.openxmlformats.org/drawingml/2006/main" xmlns:r="http://schemas.openxmlformats.org/officeDocument/2006/relationships" xmlns:p="http://schemas.openxmlformats.org/presentationml/2006/main">
+  <p:cSld>
+    <p:spTree>
+      <p:nvGrpSpPr>
+        <p:cNvPr id="1" name=""/>
+        <p:cNvGrpSpPr/>
+        <p:nvPr/>
+      </p:nvGrpSpPr>
+      <p:grpSpPr>
+        <a:xfrm>
+          <a:off x="0" y="0"/>
+          <a:ext cx="0" cy="0"/>
+          <a:chOff x="0" y="0"/>
+          <a:chExt cx="0" cy="0"/>
+        </a:xfrm>
+      </p:grpSpPr>
+      <p:sp>
+        <p:nvSpPr>
+          <p:cNvPr id="2" name="幻灯片图像占位符 1"/>
+          <p:cNvSpPr>
+            <a:spLocks noGrp="1" noRot="1" noChangeAspect="1"/>
+          </p:cNvSpPr>
+          <p:nvPr>
+            <p:ph type="sldImg"/>
+          </p:nvPr>
+        </p:nvSpPr>
+        <p:spPr/>
+      </p:sp>
+      <p:sp>
+        <p:nvSpPr>
+          <p:cNvPr id="3" name="备注占位符 2"/>
+          <p:cNvSpPr>
+            <a:spLocks noGrp="1"/>
+          </p:cNvSpPr>
+          <p:nvPr>
+            <p:ph type="body" idx="1"/>
+          </p:nvPr>
+        </p:nvSpPr>
+        <p:spPr/>
+        <p:txBody>
+          <a:bodyPr/>
+          <a:lstStyle/>
+          <a:p>
+            <a:r>
+              <a:rPr lang="en-US" altLang="zh-CN" dirty="0" smtClean="0"/>
+              <a:t>I</a:t>
+            </a:r>
+            <a:r>
+              <a:rPr lang="zh-CN" altLang="en-US" dirty="0" smtClean="0"/>
+              <a:t>：</a:t>
+            </a:r>
+            <a:r>
+              <a:rPr lang="en-US" altLang="zh-CN" dirty="0" err="1" smtClean="0"/>
+              <a:t>itemset</a:t>
+            </a:r>
+            <a:endParaRPr lang="en-US" altLang="zh-CN" dirty="0" smtClean="0"/>
+          </a:p>
+          <a:p>
+            <a:r>
+              <a:rPr lang="en-US" altLang="zh-CN" dirty="0" smtClean="0"/>
+              <a:t>D</a:t>
+            </a:r>
+            <a:r>
+              <a:rPr lang="zh-CN" altLang="en-US" dirty="0" smtClean="0"/>
+              <a:t>：</a:t>
+            </a:r>
+            <a:r>
+              <a:rPr lang="en-AU" altLang="zh-CN" dirty="0" smtClean="0"/>
+              <a:t>dataset</a:t>
+            </a:r>
+            <a:endParaRPr lang="en-US" altLang="zh-CN" dirty="0" smtClean="0"/>
+          </a:p>
+          <a:p>
+            <a:endParaRPr lang="zh-CN" altLang="en-US" dirty="0"/>
+          </a:p>
+        </p:txBody>
+      </p:sp>
+      <p:sp>
+        <p:nvSpPr>
+          <p:cNvPr id="4" name="灯片编号占位符 3"/>
+          <p:cNvSpPr>
+            <a:spLocks noGrp="1"/>
+          </p:cNvSpPr>
+          <p:nvPr>
+            <p:ph type="sldNum" sz="quarter" idx="10"/>
+          </p:nvPr>
+        </p:nvSpPr>
+        <p:spPr/>
+        <p:txBody>
+          <a:bodyPr/>
+          <a:lstStyle/>
+          <a:p>
+            <a:pPr>
+              <a:defRPr/>
+            </a:pPr>
+            <a:fld id="{0486AD57-67ED-4140-9F70-67C055736CF8}" type="slidenum">
+              <a:rPr lang="zh-CN" altLang="en-US" smtClean="0"/>
+              <a:pPr>
+                <a:defRPr/>
+              </a:pPr>
+              <a:t>11</a:t>
+            </a:fld>
+            <a:endParaRPr lang="zh-CN" altLang="en-US"/>
+          </a:p>
+        </p:txBody>
+      </p:sp>
+    </p:spTree>
+    <p:extLst>
+      <p:ext uri="{BB962C8B-B14F-4D97-AF65-F5344CB8AC3E}">
+        <p14:creationId xmlns:p14="http://schemas.microsoft.com/office/powerpoint/2010/main" val="851694877"/>
+      </p:ext>
+    </p:extLst>
+  </p:cSld>
+  <p:clrMapOvr>
+    <a:masterClrMapping/>
+  </p:clrMapOvr>
+</p:notes>
+</file>
+
+<file path=ppt/notesSlides/notesSlide2.xml><?xml version="1.0" encoding="utf-8"?>
+<p:notes xmlns:a="http://schemas.openxmlformats.org/drawingml/2006/main" xmlns:r="http://schemas.openxmlformats.org/officeDocument/2006/relationships" xmlns:p="http://schemas.openxmlformats.org/presentationml/2006/main">
+  <p:cSld>
+    <p:spTree>
+      <p:nvGrpSpPr>
+        <p:cNvPr id="1" name=""/>
+        <p:cNvGrpSpPr/>
+        <p:nvPr/>
+      </p:nvGrpSpPr>
+      <p:grpSpPr>
+        <a:xfrm>
+          <a:off x="0" y="0"/>
+          <a:ext cx="0" cy="0"/>
+          <a:chOff x="0" y="0"/>
+          <a:chExt cx="0" cy="0"/>
+        </a:xfrm>
+      </p:grpSpPr>
+      <p:sp>
+        <p:nvSpPr>
+          <p:cNvPr id="2" name="幻灯片图像占位符 1"/>
+          <p:cNvSpPr>
+            <a:spLocks noGrp="1" noRot="1" noChangeAspect="1"/>
+          </p:cNvSpPr>
+          <p:nvPr>
+            <p:ph type="sldImg"/>
+          </p:nvPr>
+        </p:nvSpPr>
+        <p:spPr/>
+      </p:sp>
+      <p:sp>
+        <p:nvSpPr>
+          <p:cNvPr id="3" name="备注占位符 2"/>
+          <p:cNvSpPr>
+            <a:spLocks noGrp="1"/>
+          </p:cNvSpPr>
+          <p:nvPr>
+            <p:ph type="body" idx="1"/>
+          </p:nvPr>
+        </p:nvSpPr>
+        <p:spPr/>
+        <p:txBody>
+          <a:bodyPr/>
+          <a:lstStyle/>
+          <a:p>
+            <a:endParaRPr lang="zh-CN" altLang="en-US" dirty="0"/>
+          </a:p>
+        </p:txBody>
+      </p:sp>
+      <p:sp>
+        <p:nvSpPr>
+          <p:cNvPr id="4" name="灯片编号占位符 3"/>
+          <p:cNvSpPr>
+            <a:spLocks noGrp="1"/>
+          </p:cNvSpPr>
+          <p:nvPr>
+            <p:ph type="sldNum" sz="quarter" idx="10"/>
+          </p:nvPr>
+        </p:nvSpPr>
+        <p:spPr/>
+        <p:txBody>
+          <a:bodyPr/>
+          <a:lstStyle/>
+          <a:p>
+            <a:pPr>
+              <a:defRPr/>
+            </a:pPr>
+            <a:fld id="{0486AD57-67ED-4140-9F70-67C055736CF8}" type="slidenum">
+              <a:rPr lang="zh-CN" altLang="en-US" smtClean="0"/>
+              <a:pPr>
+                <a:defRPr/>
+              </a:pPr>
+              <a:t>13</a:t>
+            </a:fld>
+            <a:endParaRPr lang="zh-CN" altLang="en-US"/>
+          </a:p>
+        </p:txBody>
+      </p:sp>
+    </p:spTree>
+    <p:extLst>
+      <p:ext uri="{BB962C8B-B14F-4D97-AF65-F5344CB8AC3E}">
+        <p14:creationId xmlns:p14="http://schemas.microsoft.com/office/powerpoint/2010/main" val="3467812094"/>
+      </p:ext>
+    </p:extLst>
+  </p:cSld>
+  <p:clrMapOvr>
+    <a:masterClrMapping/>
+  </p:clrMapOvr>
+</p:notes>
+</file>
+
+<file path=ppt/notesSlides/notesSlide3.xml><?xml version="1.0" encoding="utf-8"?>
+<p:notes xmlns:a="http://schemas.openxmlformats.org/drawingml/2006/main" xmlns:r="http://schemas.openxmlformats.org/officeDocument/2006/relationships" xmlns:p="http://schemas.openxmlformats.org/presentationml/2006/main">
+  <p:cSld>
+    <p:spTree>
+      <p:nvGrpSpPr>
+        <p:cNvPr id="1" name=""/>
+        <p:cNvGrpSpPr/>
+        <p:nvPr/>
+      </p:nvGrpSpPr>
+      <p:grpSpPr>
+        <a:xfrm>
+          <a:off x="0" y="0"/>
+          <a:ext cx="0" cy="0"/>
+          <a:chOff x="0" y="0"/>
+          <a:chExt cx="0" cy="0"/>
+        </a:xfrm>
+      </p:grpSpPr>
+      <p:sp>
+        <p:nvSpPr>
+          <p:cNvPr id="2" name="幻灯片图像占位符 1"/>
+          <p:cNvSpPr>
+            <a:spLocks noGrp="1" noRot="1" noChangeAspect="1"/>
+          </p:cNvSpPr>
+          <p:nvPr>
+            <p:ph type="sldImg"/>
+          </p:nvPr>
+        </p:nvSpPr>
+        <p:spPr/>
+      </p:sp>
+      <p:sp>
+        <p:nvSpPr>
+          <p:cNvPr id="3" name="备注占位符 2"/>
+          <p:cNvSpPr>
+            <a:spLocks noGrp="1"/>
+          </p:cNvSpPr>
+          <p:nvPr>
+            <p:ph type="body" idx="1"/>
+          </p:nvPr>
+        </p:nvSpPr>
+        <p:spPr/>
+        <p:txBody>
+          <a:bodyPr/>
+          <a:lstStyle/>
+          <a:p>
+            <a:r>
+              <a:rPr lang="zh-CN" altLang="en-US" dirty="0" smtClean="0"/>
+              <a:t>当两个商品分别出现的概率相差特别大的时候，要特别小心</a:t>
+            </a:r>
+            <a:endParaRPr lang="zh-CN" altLang="en-US" dirty="0"/>
+          </a:p>
+        </p:txBody>
+      </p:sp>
+      <p:sp>
+        <p:nvSpPr>
+          <p:cNvPr id="4" name="灯片编号占位符 3"/>
+          <p:cNvSpPr>
+            <a:spLocks noGrp="1"/>
+          </p:cNvSpPr>
+          <p:nvPr>
+            <p:ph type="sldNum" sz="quarter" idx="10"/>
+          </p:nvPr>
+        </p:nvSpPr>
+        <p:spPr/>
+        <p:txBody>
+          <a:bodyPr/>
+          <a:lstStyle/>
+          <a:p>
+            <a:pPr>
+              <a:defRPr/>
+            </a:pPr>
+            <a:fld id="{0486AD57-67ED-4140-9F70-67C055736CF8}" type="slidenum">
+              <a:rPr lang="zh-CN" altLang="en-US" smtClean="0"/>
+              <a:pPr>
+                <a:defRPr/>
+              </a:pPr>
+              <a:t>14</a:t>
+            </a:fld>
+            <a:endParaRPr lang="zh-CN" altLang="en-US"/>
+          </a:p>
+        </p:txBody>
+      </p:sp>
+    </p:spTree>
+    <p:extLst>
+      <p:ext uri="{BB962C8B-B14F-4D97-AF65-F5344CB8AC3E}">
+        <p14:creationId xmlns:p14="http://schemas.microsoft.com/office/powerpoint/2010/main" val="2067924104"/>
+      </p:ext>
+    </p:extLst>
+  </p:cSld>
+  <p:clrMapOvr>
+    <a:masterClrMapping/>
+  </p:clrMapOvr>
+</p:notes>
+</file>
+
+<file path=ppt/notesSlides/notesSlide4.xml><?xml version="1.0" encoding="utf-8"?>
+<p:notes xmlns:a="http://schemas.openxmlformats.org/drawingml/2006/main" xmlns:r="http://schemas.openxmlformats.org/officeDocument/2006/relationships" xmlns:p="http://schemas.openxmlformats.org/presentationml/2006/main">
+  <p:cSld>
+    <p:spTree>
+      <p:nvGrpSpPr>
+        <p:cNvPr id="1" name=""/>
+        <p:cNvGrpSpPr/>
+        <p:nvPr/>
+      </p:nvGrpSpPr>
+      <p:grpSpPr>
+        <a:xfrm>
+          <a:off x="0" y="0"/>
+          <a:ext cx="0" cy="0"/>
+          <a:chOff x="0" y="0"/>
+          <a:chExt cx="0" cy="0"/>
+        </a:xfrm>
+      </p:grpSpPr>
+      <p:sp>
+        <p:nvSpPr>
+          <p:cNvPr id="2" name="幻灯片图像占位符 1"/>
+          <p:cNvSpPr>
+            <a:spLocks noGrp="1" noRot="1" noChangeAspect="1"/>
+          </p:cNvSpPr>
+          <p:nvPr>
+            <p:ph type="sldImg"/>
+          </p:nvPr>
+        </p:nvSpPr>
+        <p:spPr/>
+      </p:sp>
+      <p:sp>
+        <p:nvSpPr>
+          <p:cNvPr id="3" name="备注占位符 2"/>
+          <p:cNvSpPr>
+            <a:spLocks noGrp="1"/>
+          </p:cNvSpPr>
+          <p:nvPr>
+            <p:ph type="body" idx="1"/>
+          </p:nvPr>
+        </p:nvSpPr>
+        <p:spPr/>
+        <p:txBody>
+          <a:bodyPr/>
+          <a:lstStyle/>
+          <a:p>
+            <a:r>
+              <a:rPr lang="zh-CN" altLang="en-US" dirty="0" smtClean="0"/>
+              <a:t>两件事情相关，不一定是因果关系。关联规则只是说明两者相关。</a:t>
+            </a:r>
+            <a:endParaRPr lang="zh-CN" altLang="en-US" dirty="0"/>
+          </a:p>
+        </p:txBody>
+      </p:sp>
+      <p:sp>
+        <p:nvSpPr>
+          <p:cNvPr id="4" name="灯片编号占位符 3"/>
+          <p:cNvSpPr>
+            <a:spLocks noGrp="1"/>
+          </p:cNvSpPr>
+          <p:nvPr>
+            <p:ph type="sldNum" sz="quarter" idx="10"/>
+          </p:nvPr>
+        </p:nvSpPr>
+        <p:spPr/>
+        <p:txBody>
+          <a:bodyPr/>
+          <a:lstStyle/>
+          <a:p>
+            <a:pPr>
+              <a:defRPr/>
+            </a:pPr>
+            <a:fld id="{0486AD57-67ED-4140-9F70-67C055736CF8}" type="slidenum">
+              <a:rPr lang="zh-CN" altLang="en-US" smtClean="0"/>
+              <a:pPr>
+                <a:defRPr/>
+              </a:pPr>
+              <a:t>15</a:t>
+            </a:fld>
+            <a:endParaRPr lang="zh-CN" altLang="en-US"/>
+          </a:p>
+        </p:txBody>
+      </p:sp>
+    </p:spTree>
+    <p:extLst>
+      <p:ext uri="{BB962C8B-B14F-4D97-AF65-F5344CB8AC3E}">
+        <p14:creationId xmlns:p14="http://schemas.microsoft.com/office/powerpoint/2010/main" val="2837840669"/>
+      </p:ext>
+    </p:extLst>
+  </p:cSld>
+  <p:clrMapOvr>
+    <a:masterClrMapping/>
+  </p:clrMapOvr>
+</p:notes>
 </file>
 
 <file path=ppt/slideLayouts/slideLayout1.xml><?xml version="1.0" encoding="utf-8"?>
@@ -9262,8 +9676,20 @@
                 <a:tableStyleId>{5C22544A-7EE6-4342-B048-85BDC9FD1C3A}</a:tableStyleId>
               </a:tblPr>
               <a:tblGrid>
-                <a:gridCol w="1774508"/>
-                <a:gridCol w="3483293"/>
+                <a:gridCol w="1774508">
+                  <a:extLst>
+                    <a:ext uri="{9D8B030D-6E8A-4147-A177-3AD203B41FA5}">
+                      <a16:colId xmlns:a16="http://schemas.microsoft.com/office/drawing/2014/main" val="20000"/>
+                    </a:ext>
+                  </a:extLst>
+                </a:gridCol>
+                <a:gridCol w="3483293">
+                  <a:extLst>
+                    <a:ext uri="{9D8B030D-6E8A-4147-A177-3AD203B41FA5}">
+                      <a16:colId xmlns:a16="http://schemas.microsoft.com/office/drawing/2014/main" val="20001"/>
+                    </a:ext>
+                  </a:extLst>
+                </a:gridCol>
               </a:tblGrid>
               <a:tr h="397934">
                 <a:tc>
@@ -9296,6 +9722,11 @@
                   </a:txBody>
                   <a:tcPr anchor="ctr"/>
                 </a:tc>
+                <a:extLst>
+                  <a:ext uri="{0D108BD9-81ED-4DB2-BD59-A6C34878D82A}">
+                    <a16:rowId xmlns:a16="http://schemas.microsoft.com/office/drawing/2014/main" val="10000"/>
+                  </a:ext>
+                </a:extLst>
               </a:tr>
               <a:tr h="397934">
                 <a:tc>
@@ -9328,6 +9759,11 @@
                   </a:txBody>
                   <a:tcPr anchor="ctr"/>
                 </a:tc>
+                <a:extLst>
+                  <a:ext uri="{0D108BD9-81ED-4DB2-BD59-A6C34878D82A}">
+                    <a16:rowId xmlns:a16="http://schemas.microsoft.com/office/drawing/2014/main" val="10001"/>
+                  </a:ext>
+                </a:extLst>
               </a:tr>
               <a:tr h="397934">
                 <a:tc>
@@ -9360,6 +9796,11 @@
                   </a:txBody>
                   <a:tcPr anchor="ctr"/>
                 </a:tc>
+                <a:extLst>
+                  <a:ext uri="{0D108BD9-81ED-4DB2-BD59-A6C34878D82A}">
+                    <a16:rowId xmlns:a16="http://schemas.microsoft.com/office/drawing/2014/main" val="10002"/>
+                  </a:ext>
+                </a:extLst>
               </a:tr>
               <a:tr h="397934">
                 <a:tc>
@@ -9392,6 +9833,11 @@
                   </a:txBody>
                   <a:tcPr anchor="ctr"/>
                 </a:tc>
+                <a:extLst>
+                  <a:ext uri="{0D108BD9-81ED-4DB2-BD59-A6C34878D82A}">
+                    <a16:rowId xmlns:a16="http://schemas.microsoft.com/office/drawing/2014/main" val="10003"/>
+                  </a:ext>
+                </a:extLst>
               </a:tr>
               <a:tr h="397934">
                 <a:tc>
@@ -9432,6 +9878,11 @@
                   </a:txBody>
                   <a:tcPr anchor="ctr"/>
                 </a:tc>
+                <a:extLst>
+                  <a:ext uri="{0D108BD9-81ED-4DB2-BD59-A6C34878D82A}">
+                    <a16:rowId xmlns:a16="http://schemas.microsoft.com/office/drawing/2014/main" val="10004"/>
+                  </a:ext>
+                </a:extLst>
               </a:tr>
               <a:tr h="397934">
                 <a:tc>
@@ -9468,6 +9919,11 @@
                   </a:txBody>
                   <a:tcPr anchor="ctr"/>
                 </a:tc>
+                <a:extLst>
+                  <a:ext uri="{0D108BD9-81ED-4DB2-BD59-A6C34878D82A}">
+                    <a16:rowId xmlns:a16="http://schemas.microsoft.com/office/drawing/2014/main" val="10005"/>
+                  </a:ext>
+                </a:extLst>
               </a:tr>
               <a:tr h="397934">
                 <a:tc>
@@ -9500,6 +9956,11 @@
                   </a:txBody>
                   <a:tcPr anchor="ctr"/>
                 </a:tc>
+                <a:extLst>
+                  <a:ext uri="{0D108BD9-81ED-4DB2-BD59-A6C34878D82A}">
+                    <a16:rowId xmlns:a16="http://schemas.microsoft.com/office/drawing/2014/main" val="10006"/>
+                  </a:ext>
+                </a:extLst>
               </a:tr>
               <a:tr h="397934">
                 <a:tc>
@@ -9540,6 +10001,11 @@
                   </a:txBody>
                   <a:tcPr anchor="ctr"/>
                 </a:tc>
+                <a:extLst>
+                  <a:ext uri="{0D108BD9-81ED-4DB2-BD59-A6C34878D82A}">
+                    <a16:rowId xmlns:a16="http://schemas.microsoft.com/office/drawing/2014/main" val="10007"/>
+                  </a:ext>
+                </a:extLst>
               </a:tr>
               <a:tr h="397934">
                 <a:tc>
@@ -9572,6 +10038,11 @@
                   </a:txBody>
                   <a:tcPr anchor="ctr"/>
                 </a:tc>
+                <a:extLst>
+                  <a:ext uri="{0D108BD9-81ED-4DB2-BD59-A6C34878D82A}">
+                    <a16:rowId xmlns:a16="http://schemas.microsoft.com/office/drawing/2014/main" val="10008"/>
+                  </a:ext>
+                </a:extLst>
               </a:tr>
             </a:tbl>
           </a:graphicData>
@@ -12284,7 +12755,7 @@
           <p:nvPr/>
         </p:nvPicPr>
         <p:blipFill>
-          <a:blip r:embed="rId2" cstate="print"/>
+          <a:blip r:embed="rId3" cstate="print"/>
           <a:srcRect/>
           <a:stretch>
             <a:fillRect/>
@@ -12310,7 +12781,7 @@
           <p:nvPr/>
         </p:nvPicPr>
         <p:blipFill>
-          <a:blip r:embed="rId3" cstate="print">
+          <a:blip r:embed="rId4" cstate="print">
             <a:extLst>
               <a:ext uri="{28A0092B-C50C-407E-A947-70E740481C1C}">
                 <a14:useLocalDpi xmlns:a14="http://schemas.microsoft.com/office/drawing/2010/main" val="0"/>
@@ -13327,7 +13798,13 @@
                 <a:tableStyleId>{5C22544A-7EE6-4342-B048-85BDC9FD1C3A}</a:tableStyleId>
               </a:tblPr>
               <a:tblGrid>
-                <a:gridCol w="1981200"/>
+                <a:gridCol w="1981200">
+                  <a:extLst>
+                    <a:ext uri="{9D8B030D-6E8A-4147-A177-3AD203B41FA5}">
+                      <a16:colId xmlns:a16="http://schemas.microsoft.com/office/drawing/2014/main" val="20000"/>
+                    </a:ext>
+                  </a:extLst>
+                </a:gridCol>
               </a:tblGrid>
               <a:tr h="0">
                 <a:tc>
@@ -13345,6 +13822,11 @@
                   </a:txBody>
                   <a:tcPr/>
                 </a:tc>
+                <a:extLst>
+                  <a:ext uri="{0D108BD9-81ED-4DB2-BD59-A6C34878D82A}">
+                    <a16:rowId xmlns:a16="http://schemas.microsoft.com/office/drawing/2014/main" val="10000"/>
+                  </a:ext>
+                </a:extLst>
               </a:tr>
               <a:tr h="370840">
                 <a:tc>
@@ -13361,6 +13843,11 @@
                   </a:txBody>
                   <a:tcPr/>
                 </a:tc>
+                <a:extLst>
+                  <a:ext uri="{0D108BD9-81ED-4DB2-BD59-A6C34878D82A}">
+                    <a16:rowId xmlns:a16="http://schemas.microsoft.com/office/drawing/2014/main" val="10001"/>
+                  </a:ext>
+                </a:extLst>
               </a:tr>
               <a:tr h="370840">
                 <a:tc>
@@ -13385,6 +13872,11 @@
                   </a:txBody>
                   <a:tcPr/>
                 </a:tc>
+                <a:extLst>
+                  <a:ext uri="{0D108BD9-81ED-4DB2-BD59-A6C34878D82A}">
+                    <a16:rowId xmlns:a16="http://schemas.microsoft.com/office/drawing/2014/main" val="10002"/>
+                  </a:ext>
+                </a:extLst>
               </a:tr>
               <a:tr h="370840">
                 <a:tc>
@@ -13401,6 +13893,11 @@
                   </a:txBody>
                   <a:tcPr/>
                 </a:tc>
+                <a:extLst>
+                  <a:ext uri="{0D108BD9-81ED-4DB2-BD59-A6C34878D82A}">
+                    <a16:rowId xmlns:a16="http://schemas.microsoft.com/office/drawing/2014/main" val="10003"/>
+                  </a:ext>
+                </a:extLst>
               </a:tr>
               <a:tr h="370840">
                 <a:tc>
@@ -13421,6 +13918,11 @@
                   </a:txBody>
                   <a:tcPr/>
                 </a:tc>
+                <a:extLst>
+                  <a:ext uri="{0D108BD9-81ED-4DB2-BD59-A6C34878D82A}">
+                    <a16:rowId xmlns:a16="http://schemas.microsoft.com/office/drawing/2014/main" val="10004"/>
+                  </a:ext>
+                </a:extLst>
               </a:tr>
               <a:tr h="370840">
                 <a:tc>
@@ -13437,6 +13939,11 @@
                   </a:txBody>
                   <a:tcPr/>
                 </a:tc>
+                <a:extLst>
+                  <a:ext uri="{0D108BD9-81ED-4DB2-BD59-A6C34878D82A}">
+                    <a16:rowId xmlns:a16="http://schemas.microsoft.com/office/drawing/2014/main" val="10005"/>
+                  </a:ext>
+                </a:extLst>
               </a:tr>
               <a:tr h="370840">
                 <a:tc>
@@ -13453,6 +13960,11 @@
                   </a:txBody>
                   <a:tcPr/>
                 </a:tc>
+                <a:extLst>
+                  <a:ext uri="{0D108BD9-81ED-4DB2-BD59-A6C34878D82A}">
+                    <a16:rowId xmlns:a16="http://schemas.microsoft.com/office/drawing/2014/main" val="10006"/>
+                  </a:ext>
+                </a:extLst>
               </a:tr>
               <a:tr h="370840">
                 <a:tc>
@@ -13477,6 +13989,11 @@
                   </a:txBody>
                   <a:tcPr/>
                 </a:tc>
+                <a:extLst>
+                  <a:ext uri="{0D108BD9-81ED-4DB2-BD59-A6C34878D82A}">
+                    <a16:rowId xmlns:a16="http://schemas.microsoft.com/office/drawing/2014/main" val="10007"/>
+                  </a:ext>
+                </a:extLst>
               </a:tr>
               <a:tr h="370840">
                 <a:tc>
@@ -13497,6 +14014,11 @@
                   </a:txBody>
                   <a:tcPr/>
                 </a:tc>
+                <a:extLst>
+                  <a:ext uri="{0D108BD9-81ED-4DB2-BD59-A6C34878D82A}">
+                    <a16:rowId xmlns:a16="http://schemas.microsoft.com/office/drawing/2014/main" val="10008"/>
+                  </a:ext>
+                </a:extLst>
               </a:tr>
             </a:tbl>
           </a:graphicData>
@@ -13518,12 +14040,12 @@
           <a:graphicData uri="http://schemas.openxmlformats.org/presentationml/2006/ole">
             <mc:AlternateContent xmlns:mc="http://schemas.openxmlformats.org/markup-compatibility/2006">
               <mc:Choice xmlns:v="urn:schemas-microsoft-com:vml" Requires="v">
-                <p:oleObj spid="_x0000_s48329" name="Equation" r:id="rId3" imgW="2870200" imgH="203200" progId="">
+                <p:oleObj spid="_x0000_s48335" name="Equation" r:id="rId4" imgW="2870200" imgH="203200" progId="">
                   <p:embed/>
                 </p:oleObj>
               </mc:Choice>
               <mc:Fallback>
-                <p:oleObj name="Equation" r:id="rId3" imgW="2870200" imgH="203200" progId="">
+                <p:oleObj name="Equation" r:id="rId4" imgW="2870200" imgH="203200" progId="">
                   <p:embed/>
                   <p:pic>
                     <p:nvPicPr>
@@ -13534,7 +14056,7 @@
                       <p:nvPr/>
                     </p:nvPicPr>
                     <p:blipFill>
-                      <a:blip r:embed="rId4">
+                      <a:blip r:embed="rId5">
                         <a:extLst>
                           <a:ext uri="{28A0092B-C50C-407E-A947-70E740481C1C}">
                             <a14:useLocalDpi xmlns:a14="http://schemas.microsoft.com/office/drawing/2010/main" val="0"/>
@@ -13575,7 +14097,7 @@
       <p:pic>
         <p:nvPicPr>
           <p:cNvPr id="48132" name="Picture 4" descr="http://t1.gstatic.com/images?q=tbn:EtUZ-5HXzfpWAM:http://xprizecars.com/images/Battery_9V.jpg">
-            <a:hlinkClick r:id="rId5"/>
+            <a:hlinkClick r:id="rId6"/>
           </p:cNvPr>
           <p:cNvPicPr>
             <a:picLocks noChangeAspect="1" noChangeArrowheads="1"/>
@@ -13583,7 +14105,7 @@
           <p:nvPr/>
         </p:nvPicPr>
         <p:blipFill>
-          <a:blip r:embed="rId6" cstate="print"/>
+          <a:blip r:embed="rId7" cstate="print"/>
           <a:srcRect/>
           <a:stretch>
             <a:fillRect/>
@@ -13670,7 +14192,7 @@
           <p:nvPr/>
         </p:nvPicPr>
         <p:blipFill>
-          <a:blip r:embed="rId7" cstate="print"/>
+          <a:blip r:embed="rId8" cstate="print"/>
           <a:srcRect/>
           <a:stretch>
             <a:fillRect/>
@@ -13696,7 +14218,7 @@
           <p:nvPr/>
         </p:nvPicPr>
         <p:blipFill>
-          <a:blip r:embed="rId8" cstate="print">
+          <a:blip r:embed="rId9" cstate="print">
             <a:extLst>
               <a:ext uri="{28A0092B-C50C-407E-A947-70E740481C1C}">
                 <a14:useLocalDpi xmlns:a14="http://schemas.microsoft.com/office/drawing/2010/main" val="0"/>
@@ -14186,7 +14708,7 @@
           <p:nvPr/>
         </p:nvPicPr>
         <p:blipFill>
-          <a:blip r:embed="rId2" cstate="print"/>
+          <a:blip r:embed="rId3" cstate="print"/>
           <a:srcRect/>
           <a:stretch>
             <a:fillRect/>
@@ -14212,7 +14734,7 @@
           <p:nvPr/>
         </p:nvPicPr>
         <p:blipFill>
-          <a:blip r:embed="rId3" cstate="print"/>
+          <a:blip r:embed="rId4" cstate="print"/>
           <a:srcRect/>
           <a:stretch>
             <a:fillRect/>
@@ -14238,7 +14760,7 @@
           <p:nvPr/>
         </p:nvPicPr>
         <p:blipFill>
-          <a:blip r:embed="rId4" cstate="print"/>
+          <a:blip r:embed="rId5" cstate="print"/>
           <a:srcRect/>
           <a:stretch>
             <a:fillRect/>
@@ -16913,7 +17435,7 @@
           <a:graphicData uri="http://schemas.openxmlformats.org/presentationml/2006/ole">
             <mc:AlternateContent xmlns:mc="http://schemas.openxmlformats.org/markup-compatibility/2006">
               <mc:Choice xmlns:v="urn:schemas-microsoft-com:vml" Requires="v">
-                <p:oleObj spid="_x0000_s58764" name="Equation" r:id="rId4" imgW="647419" imgH="203112" progId="Equation.3">
+                <p:oleObj spid="_x0000_s58776" name="Equation" r:id="rId4" imgW="647419" imgH="203112" progId="Equation.3">
                   <p:embed/>
                 </p:oleObj>
               </mc:Choice>
@@ -16989,7 +17511,7 @@
           <a:graphicData uri="http://schemas.openxmlformats.org/presentationml/2006/ole">
             <mc:AlternateContent xmlns:mc="http://schemas.openxmlformats.org/markup-compatibility/2006">
               <mc:Choice xmlns:v="urn:schemas-microsoft-com:vml" Requires="v">
-                <p:oleObj spid="_x0000_s58765" name="Equation" r:id="rId6" imgW="685800" imgH="190500" progId="Equation.3">
+                <p:oleObj spid="_x0000_s58777" name="Equation" r:id="rId6" imgW="685800" imgH="190500" progId="Equation.3">
                   <p:embed/>
                 </p:oleObj>
               </mc:Choice>
@@ -22557,7 +23079,7 @@
           <a:graphicData uri="http://schemas.openxmlformats.org/presentationml/2006/ole">
             <mc:AlternateContent xmlns:mc="http://schemas.openxmlformats.org/markup-compatibility/2006">
               <mc:Choice xmlns:v="urn:schemas-microsoft-com:vml" Requires="v">
-                <p:oleObj spid="_x0000_s90204" name="公式" r:id="rId3" imgW="1523880" imgH="228600" progId="Equation.3">
+                <p:oleObj spid="_x0000_s90240" name="公式" r:id="rId3" imgW="1523880" imgH="228600" progId="Equation.3">
                   <p:embed/>
                 </p:oleObj>
               </mc:Choice>
@@ -22627,7 +23149,7 @@
           <a:graphicData uri="http://schemas.openxmlformats.org/presentationml/2006/ole">
             <mc:AlternateContent xmlns:mc="http://schemas.openxmlformats.org/markup-compatibility/2006">
               <mc:Choice xmlns:v="urn:schemas-microsoft-com:vml" Requires="v">
-                <p:oleObj spid="_x0000_s90205" name="公式" r:id="rId5" imgW="1358640" imgH="228600" progId="Equation.3">
+                <p:oleObj spid="_x0000_s90241" name="公式" r:id="rId5" imgW="1358640" imgH="228600" progId="Equation.3">
                   <p:embed/>
                 </p:oleObj>
               </mc:Choice>
@@ -22697,7 +23219,7 @@
           <a:graphicData uri="http://schemas.openxmlformats.org/presentationml/2006/ole">
             <mc:AlternateContent xmlns:mc="http://schemas.openxmlformats.org/markup-compatibility/2006">
               <mc:Choice xmlns:v="urn:schemas-microsoft-com:vml" Requires="v">
-                <p:oleObj spid="_x0000_s90206" name="公式" r:id="rId7" imgW="2145960" imgH="215640" progId="Equation.3">
+                <p:oleObj spid="_x0000_s90242" name="公式" r:id="rId7" imgW="2145960" imgH="215640" progId="Equation.3">
                   <p:embed/>
                 </p:oleObj>
               </mc:Choice>
@@ -22773,7 +23295,7 @@
           <a:graphicData uri="http://schemas.openxmlformats.org/presentationml/2006/ole">
             <mc:AlternateContent xmlns:mc="http://schemas.openxmlformats.org/markup-compatibility/2006">
               <mc:Choice xmlns:v="urn:schemas-microsoft-com:vml" Requires="v">
-                <p:oleObj spid="_x0000_s90207" name="公式" r:id="rId9" imgW="2831760" imgH="241200" progId="Equation.3">
+                <p:oleObj spid="_x0000_s90243" name="公式" r:id="rId9" imgW="2831760" imgH="241200" progId="Equation.3">
                   <p:embed/>
                 </p:oleObj>
               </mc:Choice>
@@ -22829,7 +23351,7 @@
           <a:graphicData uri="http://schemas.openxmlformats.org/presentationml/2006/ole">
             <mc:AlternateContent xmlns:mc="http://schemas.openxmlformats.org/markup-compatibility/2006">
               <mc:Choice xmlns:v="urn:schemas-microsoft-com:vml" Requires="v">
-                <p:oleObj spid="_x0000_s90208" name="公式" r:id="rId11" imgW="571320" imgH="342720" progId="Equation.3">
+                <p:oleObj spid="_x0000_s90244" name="公式" r:id="rId11" imgW="571320" imgH="342720" progId="Equation.3">
                   <p:embed/>
                 </p:oleObj>
               </mc:Choice>
@@ -22899,7 +23421,7 @@
           <a:graphicData uri="http://schemas.openxmlformats.org/presentationml/2006/ole">
             <mc:AlternateContent xmlns:mc="http://schemas.openxmlformats.org/markup-compatibility/2006">
               <mc:Choice xmlns:v="urn:schemas-microsoft-com:vml" Requires="v">
-                <p:oleObj spid="_x0000_s90209" name="公式" r:id="rId13" imgW="1384200" imgH="215640" progId="Equation.3">
+                <p:oleObj spid="_x0000_s90245" name="公式" r:id="rId13" imgW="1384200" imgH="215640" progId="Equation.3">
                   <p:embed/>
                 </p:oleObj>
               </mc:Choice>
@@ -23391,7 +23913,7 @@
           <a:graphicData uri="http://schemas.openxmlformats.org/presentationml/2006/ole">
             <mc:AlternateContent xmlns:mc="http://schemas.openxmlformats.org/markup-compatibility/2006">
               <mc:Choice xmlns:v="urn:schemas-microsoft-com:vml" Requires="v">
-                <p:oleObj spid="_x0000_s85148" name="Equation" r:id="rId3" imgW="2095500" imgH="228600" progId="">
+                <p:oleObj spid="_x0000_s85184" name="Equation" r:id="rId3" imgW="2095500" imgH="228600" progId="">
                   <p:embed/>
                 </p:oleObj>
               </mc:Choice>
@@ -23461,7 +23983,7 @@
           <a:graphicData uri="http://schemas.openxmlformats.org/presentationml/2006/ole">
             <mc:AlternateContent xmlns:mc="http://schemas.openxmlformats.org/markup-compatibility/2006">
               <mc:Choice xmlns:v="urn:schemas-microsoft-com:vml" Requires="v">
-                <p:oleObj spid="_x0000_s85149" name="Equation" r:id="rId5" imgW="1905000" imgH="228600" progId="">
+                <p:oleObj spid="_x0000_s85185" name="Equation" r:id="rId5" imgW="1905000" imgH="228600" progId="">
                   <p:embed/>
                 </p:oleObj>
               </mc:Choice>
@@ -23537,7 +24059,7 @@
           <a:graphicData uri="http://schemas.openxmlformats.org/presentationml/2006/ole">
             <mc:AlternateContent xmlns:mc="http://schemas.openxmlformats.org/markup-compatibility/2006">
               <mc:Choice xmlns:v="urn:schemas-microsoft-com:vml" Requires="v">
-                <p:oleObj spid="_x0000_s85150" name="Equation" r:id="rId7" imgW="1155700" imgH="228600" progId="">
+                <p:oleObj spid="_x0000_s85186" name="Equation" r:id="rId7" imgW="1155700" imgH="228600" progId="">
                   <p:embed/>
                 </p:oleObj>
               </mc:Choice>
@@ -23613,7 +24135,7 @@
           <a:graphicData uri="http://schemas.openxmlformats.org/presentationml/2006/ole">
             <mc:AlternateContent xmlns:mc="http://schemas.openxmlformats.org/markup-compatibility/2006">
               <mc:Choice xmlns:v="urn:schemas-microsoft-com:vml" Requires="v">
-                <p:oleObj spid="_x0000_s85151" name="Equation" r:id="rId9" imgW="990600" imgH="228600" progId="">
+                <p:oleObj spid="_x0000_s85187" name="Equation" r:id="rId9" imgW="990600" imgH="228600" progId="">
                   <p:embed/>
                 </p:oleObj>
               </mc:Choice>
@@ -23683,7 +24205,7 @@
           <a:graphicData uri="http://schemas.openxmlformats.org/presentationml/2006/ole">
             <mc:AlternateContent xmlns:mc="http://schemas.openxmlformats.org/markup-compatibility/2006">
               <mc:Choice xmlns:v="urn:schemas-microsoft-com:vml" Requires="v">
-                <p:oleObj spid="_x0000_s85152" name="Equation" r:id="rId11" imgW="2882900" imgH="228600" progId="">
+                <p:oleObj spid="_x0000_s85188" name="Equation" r:id="rId11" imgW="2882900" imgH="228600" progId="">
                   <p:embed/>
                 </p:oleObj>
               </mc:Choice>
@@ -23753,7 +24275,7 @@
           <a:graphicData uri="http://schemas.openxmlformats.org/presentationml/2006/ole">
             <mc:AlternateContent xmlns:mc="http://schemas.openxmlformats.org/markup-compatibility/2006">
               <mc:Choice xmlns:v="urn:schemas-microsoft-com:vml" Requires="v">
-                <p:oleObj spid="_x0000_s85153" name="Equation" r:id="rId13" imgW="914400" imgH="228600" progId="">
+                <p:oleObj spid="_x0000_s85189" name="Equation" r:id="rId13" imgW="914400" imgH="228600" progId="">
                   <p:embed/>
                 </p:oleObj>
               </mc:Choice>
@@ -24302,7 +24824,7 @@
           <a:graphicData uri="http://schemas.openxmlformats.org/presentationml/2006/ole">
             <mc:AlternateContent xmlns:mc="http://schemas.openxmlformats.org/markup-compatibility/2006">
               <mc:Choice xmlns:v="urn:schemas-microsoft-com:vml" Requires="v">
-                <p:oleObj spid="_x0000_s83693" name="Equation" r:id="rId3" imgW="3035300" imgH="228600" progId="">
+                <p:oleObj spid="_x0000_s83747" name="Equation" r:id="rId3" imgW="3035300" imgH="228600" progId="">
                   <p:embed/>
                 </p:oleObj>
               </mc:Choice>
@@ -24372,7 +24894,7 @@
           <a:graphicData uri="http://schemas.openxmlformats.org/presentationml/2006/ole">
             <mc:AlternateContent xmlns:mc="http://schemas.openxmlformats.org/markup-compatibility/2006">
               <mc:Choice xmlns:v="urn:schemas-microsoft-com:vml" Requires="v">
-                <p:oleObj spid="_x0000_s83694" name="Equation" r:id="rId5" imgW="1155700" imgH="228600" progId="">
+                <p:oleObj spid="_x0000_s83748" name="Equation" r:id="rId5" imgW="1155700" imgH="228600" progId="">
                   <p:embed/>
                 </p:oleObj>
               </mc:Choice>
@@ -24442,7 +24964,7 @@
           <a:graphicData uri="http://schemas.openxmlformats.org/presentationml/2006/ole">
             <mc:AlternateContent xmlns:mc="http://schemas.openxmlformats.org/markup-compatibility/2006">
               <mc:Choice xmlns:v="urn:schemas-microsoft-com:vml" Requires="v">
-                <p:oleObj spid="_x0000_s83695" name="Equation" r:id="rId7" imgW="482391" imgH="228501" progId="">
+                <p:oleObj spid="_x0000_s83749" name="Equation" r:id="rId7" imgW="482391" imgH="228501" progId="">
                   <p:embed/>
                 </p:oleObj>
               </mc:Choice>
@@ -24512,7 +25034,7 @@
           <a:graphicData uri="http://schemas.openxmlformats.org/presentationml/2006/ole">
             <mc:AlternateContent xmlns:mc="http://schemas.openxmlformats.org/markup-compatibility/2006">
               <mc:Choice xmlns:v="urn:schemas-microsoft-com:vml" Requires="v">
-                <p:oleObj spid="_x0000_s83696" name="Equation" r:id="rId9" imgW="1498600" imgH="228600" progId="">
+                <p:oleObj spid="_x0000_s83750" name="Equation" r:id="rId9" imgW="1498600" imgH="228600" progId="">
                   <p:embed/>
                 </p:oleObj>
               </mc:Choice>
@@ -24582,7 +25104,7 @@
           <a:graphicData uri="http://schemas.openxmlformats.org/presentationml/2006/ole">
             <mc:AlternateContent xmlns:mc="http://schemas.openxmlformats.org/markup-compatibility/2006">
               <mc:Choice xmlns:v="urn:schemas-microsoft-com:vml" Requires="v">
-                <p:oleObj spid="_x0000_s83697" name="Equation" r:id="rId11" imgW="914400" imgH="228600" progId="">
+                <p:oleObj spid="_x0000_s83751" name="Equation" r:id="rId11" imgW="914400" imgH="228600" progId="">
                   <p:embed/>
                 </p:oleObj>
               </mc:Choice>
@@ -24652,7 +25174,7 @@
           <a:graphicData uri="http://schemas.openxmlformats.org/presentationml/2006/ole">
             <mc:AlternateContent xmlns:mc="http://schemas.openxmlformats.org/markup-compatibility/2006">
               <mc:Choice xmlns:v="urn:schemas-microsoft-com:vml" Requires="v">
-                <p:oleObj spid="_x0000_s83698" name="Equation" r:id="rId13" imgW="1130300" imgH="228600" progId="">
+                <p:oleObj spid="_x0000_s83752" name="Equation" r:id="rId13" imgW="1130300" imgH="228600" progId="">
                   <p:embed/>
                 </p:oleObj>
               </mc:Choice>
@@ -24722,7 +25244,7 @@
           <a:graphicData uri="http://schemas.openxmlformats.org/presentationml/2006/ole">
             <mc:AlternateContent xmlns:mc="http://schemas.openxmlformats.org/markup-compatibility/2006">
               <mc:Choice xmlns:v="urn:schemas-microsoft-com:vml" Requires="v">
-                <p:oleObj spid="_x0000_s83699" name="Equation" r:id="rId15" imgW="914400" imgH="228600" progId="">
+                <p:oleObj spid="_x0000_s83753" name="Equation" r:id="rId15" imgW="914400" imgH="228600" progId="">
                   <p:embed/>
                 </p:oleObj>
               </mc:Choice>
@@ -24820,7 +25342,7 @@
           <a:graphicData uri="http://schemas.openxmlformats.org/presentationml/2006/ole">
             <mc:AlternateContent xmlns:mc="http://schemas.openxmlformats.org/markup-compatibility/2006">
               <mc:Choice xmlns:v="urn:schemas-microsoft-com:vml" Requires="v">
-                <p:oleObj spid="_x0000_s83700" name="Equation" r:id="rId19" imgW="1143000" imgH="228600" progId="">
+                <p:oleObj spid="_x0000_s83754" name="Equation" r:id="rId19" imgW="1143000" imgH="228600" progId="">
                   <p:embed/>
                 </p:oleObj>
               </mc:Choice>
@@ -24890,7 +25412,7 @@
           <a:graphicData uri="http://schemas.openxmlformats.org/presentationml/2006/ole">
             <mc:AlternateContent xmlns:mc="http://schemas.openxmlformats.org/markup-compatibility/2006">
               <mc:Choice xmlns:v="urn:schemas-microsoft-com:vml" Requires="v">
-                <p:oleObj spid="_x0000_s83701" name="Equation" r:id="rId21" imgW="482391" imgH="228501" progId="">
+                <p:oleObj spid="_x0000_s83755" name="Equation" r:id="rId21" imgW="482391" imgH="228501" progId="">
                   <p:embed/>
                 </p:oleObj>
               </mc:Choice>
@@ -25604,7 +26126,7 @@
           <a:graphicData uri="http://schemas.openxmlformats.org/presentationml/2006/ole">
             <mc:AlternateContent xmlns:mc="http://schemas.openxmlformats.org/markup-compatibility/2006">
               <mc:Choice xmlns:v="urn:schemas-microsoft-com:vml" Requires="v">
-                <p:oleObj spid="_x0000_s80462" name="Equation" r:id="rId3" imgW="1562100" imgH="228600" progId="">
+                <p:oleObj spid="_x0000_s80480" name="Equation" r:id="rId3" imgW="1562100" imgH="228600" progId="">
                   <p:embed/>
                 </p:oleObj>
               </mc:Choice>
@@ -25674,7 +26196,7 @@
           <a:graphicData uri="http://schemas.openxmlformats.org/presentationml/2006/ole">
             <mc:AlternateContent xmlns:mc="http://schemas.openxmlformats.org/markup-compatibility/2006">
               <mc:Choice xmlns:v="urn:schemas-microsoft-com:vml" Requires="v">
-                <p:oleObj spid="_x0000_s80463" name="Equation" r:id="rId5" imgW="1422400" imgH="939800" progId="">
+                <p:oleObj spid="_x0000_s80481" name="Equation" r:id="rId5" imgW="1422400" imgH="939800" progId="">
                   <p:embed/>
                 </p:oleObj>
               </mc:Choice>
@@ -25854,7 +26376,7 @@
           <a:graphicData uri="http://schemas.openxmlformats.org/presentationml/2006/ole">
             <mc:AlternateContent xmlns:mc="http://schemas.openxmlformats.org/markup-compatibility/2006">
               <mc:Choice xmlns:v="urn:schemas-microsoft-com:vml" Requires="v">
-                <p:oleObj spid="_x0000_s80464" name="Equation" r:id="rId8" imgW="1765300" imgH="228600" progId="">
+                <p:oleObj spid="_x0000_s80482" name="Equation" r:id="rId8" imgW="1765300" imgH="228600" progId="">
                   <p:embed/>
                 </p:oleObj>
               </mc:Choice>
@@ -27085,7 +27607,7 @@
                         <m:dPr>
                           <m:ctrlPr>
                             <a:rPr lang="en-US" altLang="zh-CN" b="0" i="1" smtClean="0">
-                              <a:latin typeface="Cambria Math"/>
+                              <a:latin typeface="Cambria Math" panose="02040503050406030204" pitchFamily="18" charset="0"/>
                             </a:rPr>
                           </m:ctrlPr>
                         </m:dPr>
@@ -27123,7 +27645,7 @@
                         <m:fPr>
                           <m:ctrlPr>
                             <a:rPr lang="en-US" altLang="zh-CN" b="0" i="1" smtClean="0">
-                              <a:latin typeface="Cambria Math"/>
+                              <a:latin typeface="Cambria Math" panose="02040503050406030204" pitchFamily="18" charset="0"/>
                               <a:ea typeface="Cambria Math"/>
                             </a:rPr>
                           </m:ctrlPr>
@@ -27193,7 +27715,7 @@
                               <m:endChr m:val="}"/>
                               <m:ctrlPr>
                                 <a:rPr lang="en-US" altLang="zh-CN" b="0" i="1" smtClean="0">
-                                  <a:latin typeface="Cambria Math"/>
+                                  <a:latin typeface="Cambria Math" panose="02040503050406030204" pitchFamily="18" charset="0"/>
                                   <a:ea typeface="Cambria Math"/>
                                 </a:rPr>
                               </m:ctrlPr>
@@ -27228,7 +27750,7 @@
                         <m:fPr>
                           <m:ctrlPr>
                             <a:rPr lang="en-US" altLang="zh-CN" b="0" i="1" smtClean="0">
-                              <a:latin typeface="Cambria Math"/>
+                              <a:latin typeface="Cambria Math" panose="02040503050406030204" pitchFamily="18" charset="0"/>
                               <a:ea typeface="Cambria Math"/>
                             </a:rPr>
                           </m:ctrlPr>
@@ -30680,9 +31202,27 @@
                 <a:tableStyleId>{5C22544A-7EE6-4342-B048-85BDC9FD1C3A}</a:tableStyleId>
               </a:tblPr>
               <a:tblGrid>
-                <a:gridCol w="2971800"/>
-                <a:gridCol w="2514600"/>
-                <a:gridCol w="1600200"/>
+                <a:gridCol w="2971800">
+                  <a:extLst>
+                    <a:ext uri="{9D8B030D-6E8A-4147-A177-3AD203B41FA5}">
+                      <a16:colId xmlns:a16="http://schemas.microsoft.com/office/drawing/2014/main" val="20000"/>
+                    </a:ext>
+                  </a:extLst>
+                </a:gridCol>
+                <a:gridCol w="2514600">
+                  <a:extLst>
+                    <a:ext uri="{9D8B030D-6E8A-4147-A177-3AD203B41FA5}">
+                      <a16:colId xmlns:a16="http://schemas.microsoft.com/office/drawing/2014/main" val="20001"/>
+                    </a:ext>
+                  </a:extLst>
+                </a:gridCol>
+                <a:gridCol w="1600200">
+                  <a:extLst>
+                    <a:ext uri="{9D8B030D-6E8A-4147-A177-3AD203B41FA5}">
+                      <a16:colId xmlns:a16="http://schemas.microsoft.com/office/drawing/2014/main" val="20002"/>
+                    </a:ext>
+                  </a:extLst>
+                </a:gridCol>
               </a:tblGrid>
               <a:tr h="370840">
                 <a:tc>
@@ -30730,6 +31270,11 @@
                   </a:txBody>
                   <a:tcPr anchor="ctr"/>
                 </a:tc>
+                <a:extLst>
+                  <a:ext uri="{0D108BD9-81ED-4DB2-BD59-A6C34878D82A}">
+                    <a16:rowId xmlns:a16="http://schemas.microsoft.com/office/drawing/2014/main" val="10000"/>
+                  </a:ext>
+                </a:extLst>
               </a:tr>
               <a:tr h="370840">
                 <a:tc>
@@ -30829,6 +31374,11 @@
                   </a:txBody>
                   <a:tcPr anchor="ctr"/>
                 </a:tc>
+                <a:extLst>
+                  <a:ext uri="{0D108BD9-81ED-4DB2-BD59-A6C34878D82A}">
+                    <a16:rowId xmlns:a16="http://schemas.microsoft.com/office/drawing/2014/main" val="10001"/>
+                  </a:ext>
+                </a:extLst>
               </a:tr>
               <a:tr h="370840">
                 <a:tc>
@@ -30973,6 +31523,11 @@
                   </a:txBody>
                   <a:tcPr anchor="ctr"/>
                 </a:tc>
+                <a:extLst>
+                  <a:ext uri="{0D108BD9-81ED-4DB2-BD59-A6C34878D82A}">
+                    <a16:rowId xmlns:a16="http://schemas.microsoft.com/office/drawing/2014/main" val="10002"/>
+                  </a:ext>
+                </a:extLst>
               </a:tr>
               <a:tr h="370840">
                 <a:tc>
@@ -31020,6 +31575,11 @@
                   </a:txBody>
                   <a:tcPr anchor="ctr"/>
                 </a:tc>
+                <a:extLst>
+                  <a:ext uri="{0D108BD9-81ED-4DB2-BD59-A6C34878D82A}">
+                    <a16:rowId xmlns:a16="http://schemas.microsoft.com/office/drawing/2014/main" val="10003"/>
+                  </a:ext>
+                </a:extLst>
               </a:tr>
               <a:tr h="370840">
                 <a:tc>
@@ -31095,6 +31655,11 @@
                   </a:txBody>
                   <a:tcPr anchor="ctr"/>
                 </a:tc>
+                <a:extLst>
+                  <a:ext uri="{0D108BD9-81ED-4DB2-BD59-A6C34878D82A}">
+                    <a16:rowId xmlns:a16="http://schemas.microsoft.com/office/drawing/2014/main" val="10004"/>
+                  </a:ext>
+                </a:extLst>
               </a:tr>
             </a:tbl>
           </a:graphicData>
@@ -31415,9 +31980,27 @@
                 <a:tableStyleId>{5C22544A-7EE6-4342-B048-85BDC9FD1C3A}</a:tableStyleId>
               </a:tblPr>
               <a:tblGrid>
-                <a:gridCol w="1016000"/>
-                <a:gridCol w="1016000"/>
-                <a:gridCol w="1016000"/>
+                <a:gridCol w="1016000">
+                  <a:extLst>
+                    <a:ext uri="{9D8B030D-6E8A-4147-A177-3AD203B41FA5}">
+                      <a16:colId xmlns:a16="http://schemas.microsoft.com/office/drawing/2014/main" val="20000"/>
+                    </a:ext>
+                  </a:extLst>
+                </a:gridCol>
+                <a:gridCol w="1016000">
+                  <a:extLst>
+                    <a:ext uri="{9D8B030D-6E8A-4147-A177-3AD203B41FA5}">
+                      <a16:colId xmlns:a16="http://schemas.microsoft.com/office/drawing/2014/main" val="20001"/>
+                    </a:ext>
+                  </a:extLst>
+                </a:gridCol>
+                <a:gridCol w="1016000">
+                  <a:extLst>
+                    <a:ext uri="{9D8B030D-6E8A-4147-A177-3AD203B41FA5}">
+                      <a16:colId xmlns:a16="http://schemas.microsoft.com/office/drawing/2014/main" val="20002"/>
+                    </a:ext>
+                  </a:extLst>
+                </a:gridCol>
               </a:tblGrid>
               <a:tr h="370840">
                 <a:tc>
@@ -31465,6 +32048,11 @@
                   </a:txBody>
                   <a:tcPr/>
                 </a:tc>
+                <a:extLst>
+                  <a:ext uri="{0D108BD9-81ED-4DB2-BD59-A6C34878D82A}">
+                    <a16:rowId xmlns:a16="http://schemas.microsoft.com/office/drawing/2014/main" val="10000"/>
+                  </a:ext>
+                </a:extLst>
               </a:tr>
               <a:tr h="370840">
                 <a:tc>
@@ -31512,6 +32100,11 @@
                   </a:txBody>
                   <a:tcPr/>
                 </a:tc>
+                <a:extLst>
+                  <a:ext uri="{0D108BD9-81ED-4DB2-BD59-A6C34878D82A}">
+                    <a16:rowId xmlns:a16="http://schemas.microsoft.com/office/drawing/2014/main" val="10001"/>
+                  </a:ext>
+                </a:extLst>
               </a:tr>
               <a:tr h="370840">
                 <a:tc>
@@ -31559,6 +32152,11 @@
                   </a:txBody>
                   <a:tcPr/>
                 </a:tc>
+                <a:extLst>
+                  <a:ext uri="{0D108BD9-81ED-4DB2-BD59-A6C34878D82A}">
+                    <a16:rowId xmlns:a16="http://schemas.microsoft.com/office/drawing/2014/main" val="10002"/>
+                  </a:ext>
+                </a:extLst>
               </a:tr>
               <a:tr h="370840">
                 <a:tc>
@@ -31606,6 +32204,11 @@
                   </a:txBody>
                   <a:tcPr/>
                 </a:tc>
+                <a:extLst>
+                  <a:ext uri="{0D108BD9-81ED-4DB2-BD59-A6C34878D82A}">
+                    <a16:rowId xmlns:a16="http://schemas.microsoft.com/office/drawing/2014/main" val="10003"/>
+                  </a:ext>
+                </a:extLst>
               </a:tr>
               <a:tr h="370840">
                 <a:tc>
@@ -31653,6 +32256,11 @@
                   </a:txBody>
                   <a:tcPr/>
                 </a:tc>
+                <a:extLst>
+                  <a:ext uri="{0D108BD9-81ED-4DB2-BD59-A6C34878D82A}">
+                    <a16:rowId xmlns:a16="http://schemas.microsoft.com/office/drawing/2014/main" val="10004"/>
+                  </a:ext>
+                </a:extLst>
               </a:tr>
               <a:tr h="370840">
                 <a:tc>
@@ -31700,6 +32308,11 @@
                   </a:txBody>
                   <a:tcPr/>
                 </a:tc>
+                <a:extLst>
+                  <a:ext uri="{0D108BD9-81ED-4DB2-BD59-A6C34878D82A}">
+                    <a16:rowId xmlns:a16="http://schemas.microsoft.com/office/drawing/2014/main" val="10005"/>
+                  </a:ext>
+                </a:extLst>
               </a:tr>
               <a:tr h="370840">
                 <a:tc>
@@ -31747,6 +32360,11 @@
                   </a:txBody>
                   <a:tcPr/>
                 </a:tc>
+                <a:extLst>
+                  <a:ext uri="{0D108BD9-81ED-4DB2-BD59-A6C34878D82A}">
+                    <a16:rowId xmlns:a16="http://schemas.microsoft.com/office/drawing/2014/main" val="10006"/>
+                  </a:ext>
+                </a:extLst>
               </a:tr>
               <a:tr h="370840">
                 <a:tc>
@@ -31794,6 +32412,11 @@
                   </a:txBody>
                   <a:tcPr/>
                 </a:tc>
+                <a:extLst>
+                  <a:ext uri="{0D108BD9-81ED-4DB2-BD59-A6C34878D82A}">
+                    <a16:rowId xmlns:a16="http://schemas.microsoft.com/office/drawing/2014/main" val="10007"/>
+                  </a:ext>
+                </a:extLst>
               </a:tr>
               <a:tr h="370840">
                 <a:tc>
@@ -31841,6 +32464,11 @@
                   </a:txBody>
                   <a:tcPr/>
                 </a:tc>
+                <a:extLst>
+                  <a:ext uri="{0D108BD9-81ED-4DB2-BD59-A6C34878D82A}">
+                    <a16:rowId xmlns:a16="http://schemas.microsoft.com/office/drawing/2014/main" val="10008"/>
+                  </a:ext>
+                </a:extLst>
               </a:tr>
               <a:tr h="370840">
                 <a:tc>
@@ -31888,6 +32516,11 @@
                   </a:txBody>
                   <a:tcPr/>
                 </a:tc>
+                <a:extLst>
+                  <a:ext uri="{0D108BD9-81ED-4DB2-BD59-A6C34878D82A}">
+                    <a16:rowId xmlns:a16="http://schemas.microsoft.com/office/drawing/2014/main" val="10009"/>
+                  </a:ext>
+                </a:extLst>
               </a:tr>
               <a:tr h="370840">
                 <a:tc>
@@ -31935,6 +32568,11 @@
                   </a:txBody>
                   <a:tcPr/>
                 </a:tc>
+                <a:extLst>
+                  <a:ext uri="{0D108BD9-81ED-4DB2-BD59-A6C34878D82A}">
+                    <a16:rowId xmlns:a16="http://schemas.microsoft.com/office/drawing/2014/main" val="10010"/>
+                  </a:ext>
+                </a:extLst>
               </a:tr>
               <a:tr h="370840">
                 <a:tc>
@@ -31986,6 +32624,11 @@
                   </a:txBody>
                   <a:tcPr/>
                 </a:tc>
+                <a:extLst>
+                  <a:ext uri="{0D108BD9-81ED-4DB2-BD59-A6C34878D82A}">
+                    <a16:rowId xmlns:a16="http://schemas.microsoft.com/office/drawing/2014/main" val="10011"/>
+                  </a:ext>
+                </a:extLst>
               </a:tr>
               <a:tr h="370840">
                 <a:tc>
@@ -32033,6 +32676,11 @@
                   </a:txBody>
                   <a:tcPr/>
                 </a:tc>
+                <a:extLst>
+                  <a:ext uri="{0D108BD9-81ED-4DB2-BD59-A6C34878D82A}">
+                    <a16:rowId xmlns:a16="http://schemas.microsoft.com/office/drawing/2014/main" val="10012"/>
+                  </a:ext>
+                </a:extLst>
               </a:tr>
               <a:tr h="370840">
                 <a:tc>
@@ -32080,6 +32728,11 @@
                   </a:txBody>
                   <a:tcPr/>
                 </a:tc>
+                <a:extLst>
+                  <a:ext uri="{0D108BD9-81ED-4DB2-BD59-A6C34878D82A}">
+                    <a16:rowId xmlns:a16="http://schemas.microsoft.com/office/drawing/2014/main" val="10013"/>
+                  </a:ext>
+                </a:extLst>
               </a:tr>
             </a:tbl>
           </a:graphicData>
@@ -32110,8 +32763,20 @@
                 <a:tableStyleId>{5C22544A-7EE6-4342-B048-85BDC9FD1C3A}</a:tableStyleId>
               </a:tblPr>
               <a:tblGrid>
-                <a:gridCol w="2195384"/>
-                <a:gridCol w="928816"/>
+                <a:gridCol w="2195384">
+                  <a:extLst>
+                    <a:ext uri="{9D8B030D-6E8A-4147-A177-3AD203B41FA5}">
+                      <a16:colId xmlns:a16="http://schemas.microsoft.com/office/drawing/2014/main" val="20000"/>
+                    </a:ext>
+                  </a:extLst>
+                </a:gridCol>
+                <a:gridCol w="928816">
+                  <a:extLst>
+                    <a:ext uri="{9D8B030D-6E8A-4147-A177-3AD203B41FA5}">
+                      <a16:colId xmlns:a16="http://schemas.microsoft.com/office/drawing/2014/main" val="20001"/>
+                    </a:ext>
+                  </a:extLst>
+                </a:gridCol>
               </a:tblGrid>
               <a:tr h="370840">
                 <a:tc gridSpan="2">
@@ -32139,6 +32804,11 @@
                   </a:txBody>
                   <a:tcPr/>
                 </a:tc>
+                <a:extLst>
+                  <a:ext uri="{0D108BD9-81ED-4DB2-BD59-A6C34878D82A}">
+                    <a16:rowId xmlns:a16="http://schemas.microsoft.com/office/drawing/2014/main" val="10000"/>
+                  </a:ext>
+                </a:extLst>
               </a:tr>
               <a:tr h="370840">
                 <a:tc>
@@ -32175,6 +32845,11 @@
                   </a:txBody>
                   <a:tcPr anchor="ctr"/>
                 </a:tc>
+                <a:extLst>
+                  <a:ext uri="{0D108BD9-81ED-4DB2-BD59-A6C34878D82A}">
+                    <a16:rowId xmlns:a16="http://schemas.microsoft.com/office/drawing/2014/main" val="10001"/>
+                  </a:ext>
+                </a:extLst>
               </a:tr>
               <a:tr h="370840">
                 <a:tc>
@@ -32207,6 +32882,11 @@
                   </a:txBody>
                   <a:tcPr anchor="ctr"/>
                 </a:tc>
+                <a:extLst>
+                  <a:ext uri="{0D108BD9-81ED-4DB2-BD59-A6C34878D82A}">
+                    <a16:rowId xmlns:a16="http://schemas.microsoft.com/office/drawing/2014/main" val="10002"/>
+                  </a:ext>
+                </a:extLst>
               </a:tr>
               <a:tr h="370840">
                 <a:tc>
@@ -32239,6 +32919,11 @@
                   </a:txBody>
                   <a:tcPr anchor="ctr"/>
                 </a:tc>
+                <a:extLst>
+                  <a:ext uri="{0D108BD9-81ED-4DB2-BD59-A6C34878D82A}">
+                    <a16:rowId xmlns:a16="http://schemas.microsoft.com/office/drawing/2014/main" val="10003"/>
+                  </a:ext>
+                </a:extLst>
               </a:tr>
               <a:tr h="370840">
                 <a:tc>
@@ -32271,6 +32956,11 @@
                   </a:txBody>
                   <a:tcPr anchor="ctr"/>
                 </a:tc>
+                <a:extLst>
+                  <a:ext uri="{0D108BD9-81ED-4DB2-BD59-A6C34878D82A}">
+                    <a16:rowId xmlns:a16="http://schemas.microsoft.com/office/drawing/2014/main" val="10004"/>
+                  </a:ext>
+                </a:extLst>
               </a:tr>
               <a:tr h="370840">
                 <a:tc>
@@ -32303,6 +32993,11 @@
                   </a:txBody>
                   <a:tcPr anchor="ctr"/>
                 </a:tc>
+                <a:extLst>
+                  <a:ext uri="{0D108BD9-81ED-4DB2-BD59-A6C34878D82A}">
+                    <a16:rowId xmlns:a16="http://schemas.microsoft.com/office/drawing/2014/main" val="10005"/>
+                  </a:ext>
+                </a:extLst>
               </a:tr>
               <a:tr h="370840">
                 <a:tc>
@@ -32335,6 +33030,11 @@
                   </a:txBody>
                   <a:tcPr anchor="ctr"/>
                 </a:tc>
+                <a:extLst>
+                  <a:ext uri="{0D108BD9-81ED-4DB2-BD59-A6C34878D82A}">
+                    <a16:rowId xmlns:a16="http://schemas.microsoft.com/office/drawing/2014/main" val="10006"/>
+                  </a:ext>
+                </a:extLst>
               </a:tr>
               <a:tr h="370840">
                 <a:tc>
@@ -32367,6 +33067,11 @@
                   </a:txBody>
                   <a:tcPr anchor="ctr"/>
                 </a:tc>
+                <a:extLst>
+                  <a:ext uri="{0D108BD9-81ED-4DB2-BD59-A6C34878D82A}">
+                    <a16:rowId xmlns:a16="http://schemas.microsoft.com/office/drawing/2014/main" val="10007"/>
+                  </a:ext>
+                </a:extLst>
               </a:tr>
               <a:tr h="370840">
                 <a:tc>
@@ -32403,6 +33108,11 @@
                   </a:txBody>
                   <a:tcPr anchor="ctr"/>
                 </a:tc>
+                <a:extLst>
+                  <a:ext uri="{0D108BD9-81ED-4DB2-BD59-A6C34878D82A}">
+                    <a16:rowId xmlns:a16="http://schemas.microsoft.com/office/drawing/2014/main" val="10008"/>
+                  </a:ext>
+                </a:extLst>
               </a:tr>
               <a:tr h="370840">
                 <a:tc>
@@ -32439,6 +33149,11 @@
                   </a:txBody>
                   <a:tcPr anchor="ctr"/>
                 </a:tc>
+                <a:extLst>
+                  <a:ext uri="{0D108BD9-81ED-4DB2-BD59-A6C34878D82A}">
+                    <a16:rowId xmlns:a16="http://schemas.microsoft.com/office/drawing/2014/main" val="10009"/>
+                  </a:ext>
+                </a:extLst>
               </a:tr>
             </a:tbl>
           </a:graphicData>
@@ -32634,7 +33349,7 @@
                       <m:fPr>
                         <m:ctrlPr>
                           <a:rPr lang="en-US" altLang="zh-CN" sz="1600" i="1" smtClean="0">
-                            <a:latin typeface="Cambria Math"/>
+                            <a:latin typeface="Cambria Math" panose="02040503050406030204" pitchFamily="18" charset="0"/>
                           </a:rPr>
                         </m:ctrlPr>
                       </m:fPr>
@@ -33525,7 +34240,13 @@
                 <a:tableStyleId>{5C22544A-7EE6-4342-B048-85BDC9FD1C3A}</a:tableStyleId>
               </a:tblPr>
               <a:tblGrid>
-                <a:gridCol w="2057400"/>
+                <a:gridCol w="2057400">
+                  <a:extLst>
+                    <a:ext uri="{9D8B030D-6E8A-4147-A177-3AD203B41FA5}">
+                      <a16:colId xmlns:a16="http://schemas.microsoft.com/office/drawing/2014/main" val="20000"/>
+                    </a:ext>
+                  </a:extLst>
+                </a:gridCol>
               </a:tblGrid>
               <a:tr h="370840">
                 <a:tc>
@@ -33543,6 +34264,11 @@
                   </a:txBody>
                   <a:tcPr/>
                 </a:tc>
+                <a:extLst>
+                  <a:ext uri="{0D108BD9-81ED-4DB2-BD59-A6C34878D82A}">
+                    <a16:rowId xmlns:a16="http://schemas.microsoft.com/office/drawing/2014/main" val="10000"/>
+                  </a:ext>
+                </a:extLst>
               </a:tr>
               <a:tr h="370840">
                 <a:tc>
@@ -33560,6 +34286,11 @@
                   </a:txBody>
                   <a:tcPr/>
                 </a:tc>
+                <a:extLst>
+                  <a:ext uri="{0D108BD9-81ED-4DB2-BD59-A6C34878D82A}">
+                    <a16:rowId xmlns:a16="http://schemas.microsoft.com/office/drawing/2014/main" val="10001"/>
+                  </a:ext>
+                </a:extLst>
               </a:tr>
               <a:tr h="370840">
                 <a:tc>
@@ -33581,6 +34312,11 @@
                   </a:txBody>
                   <a:tcPr/>
                 </a:tc>
+                <a:extLst>
+                  <a:ext uri="{0D108BD9-81ED-4DB2-BD59-A6C34878D82A}">
+                    <a16:rowId xmlns:a16="http://schemas.microsoft.com/office/drawing/2014/main" val="10002"/>
+                  </a:ext>
+                </a:extLst>
               </a:tr>
               <a:tr h="370840">
                 <a:tc>
@@ -33598,6 +34334,11 @@
                   </a:txBody>
                   <a:tcPr/>
                 </a:tc>
+                <a:extLst>
+                  <a:ext uri="{0D108BD9-81ED-4DB2-BD59-A6C34878D82A}">
+                    <a16:rowId xmlns:a16="http://schemas.microsoft.com/office/drawing/2014/main" val="10003"/>
+                  </a:ext>
+                </a:extLst>
               </a:tr>
               <a:tr h="370840">
                 <a:tc>
@@ -33615,6 +34356,11 @@
                   </a:txBody>
                   <a:tcPr/>
                 </a:tc>
+                <a:extLst>
+                  <a:ext uri="{0D108BD9-81ED-4DB2-BD59-A6C34878D82A}">
+                    <a16:rowId xmlns:a16="http://schemas.microsoft.com/office/drawing/2014/main" val="10004"/>
+                  </a:ext>
+                </a:extLst>
               </a:tr>
               <a:tr h="370840">
                 <a:tc>
@@ -33636,6 +34382,11 @@
                   </a:txBody>
                   <a:tcPr/>
                 </a:tc>
+                <a:extLst>
+                  <a:ext uri="{0D108BD9-81ED-4DB2-BD59-A6C34878D82A}">
+                    <a16:rowId xmlns:a16="http://schemas.microsoft.com/office/drawing/2014/main" val="10005"/>
+                  </a:ext>
+                </a:extLst>
               </a:tr>
               <a:tr h="370840">
                 <a:tc>
@@ -33653,6 +34404,11 @@
                   </a:txBody>
                   <a:tcPr/>
                 </a:tc>
+                <a:extLst>
+                  <a:ext uri="{0D108BD9-81ED-4DB2-BD59-A6C34878D82A}">
+                    <a16:rowId xmlns:a16="http://schemas.microsoft.com/office/drawing/2014/main" val="10006"/>
+                  </a:ext>
+                </a:extLst>
               </a:tr>
               <a:tr h="370840">
                 <a:tc>
@@ -33670,6 +34426,11 @@
                   </a:txBody>
                   <a:tcPr/>
                 </a:tc>
+                <a:extLst>
+                  <a:ext uri="{0D108BD9-81ED-4DB2-BD59-A6C34878D82A}">
+                    <a16:rowId xmlns:a16="http://schemas.microsoft.com/office/drawing/2014/main" val="10007"/>
+                  </a:ext>
+                </a:extLst>
               </a:tr>
             </a:tbl>
           </a:graphicData>
@@ -33700,7 +34461,13 @@
                 <a:tableStyleId>{5C22544A-7EE6-4342-B048-85BDC9FD1C3A}</a:tableStyleId>
               </a:tblPr>
               <a:tblGrid>
-                <a:gridCol w="2514600"/>
+                <a:gridCol w="2514600">
+                  <a:extLst>
+                    <a:ext uri="{9D8B030D-6E8A-4147-A177-3AD203B41FA5}">
+                      <a16:colId xmlns:a16="http://schemas.microsoft.com/office/drawing/2014/main" val="20000"/>
+                    </a:ext>
+                  </a:extLst>
+                </a:gridCol>
               </a:tblGrid>
               <a:tr h="370840">
                 <a:tc>
@@ -33718,6 +34485,11 @@
                   </a:txBody>
                   <a:tcPr/>
                 </a:tc>
+                <a:extLst>
+                  <a:ext uri="{0D108BD9-81ED-4DB2-BD59-A6C34878D82A}">
+                    <a16:rowId xmlns:a16="http://schemas.microsoft.com/office/drawing/2014/main" val="10000"/>
+                  </a:ext>
+                </a:extLst>
               </a:tr>
               <a:tr h="370840">
                 <a:tc>
@@ -33735,6 +34507,11 @@
                   </a:txBody>
                   <a:tcPr/>
                 </a:tc>
+                <a:extLst>
+                  <a:ext uri="{0D108BD9-81ED-4DB2-BD59-A6C34878D82A}">
+                    <a16:rowId xmlns:a16="http://schemas.microsoft.com/office/drawing/2014/main" val="10001"/>
+                  </a:ext>
+                </a:extLst>
               </a:tr>
               <a:tr h="370840">
                 <a:tc>
@@ -33756,6 +34533,11 @@
                   </a:txBody>
                   <a:tcPr/>
                 </a:tc>
+                <a:extLst>
+                  <a:ext uri="{0D108BD9-81ED-4DB2-BD59-A6C34878D82A}">
+                    <a16:rowId xmlns:a16="http://schemas.microsoft.com/office/drawing/2014/main" val="10002"/>
+                  </a:ext>
+                </a:extLst>
               </a:tr>
               <a:tr h="370840">
                 <a:tc>
@@ -33773,6 +34555,11 @@
                   </a:txBody>
                   <a:tcPr/>
                 </a:tc>
+                <a:extLst>
+                  <a:ext uri="{0D108BD9-81ED-4DB2-BD59-A6C34878D82A}">
+                    <a16:rowId xmlns:a16="http://schemas.microsoft.com/office/drawing/2014/main" val="10003"/>
+                  </a:ext>
+                </a:extLst>
               </a:tr>
               <a:tr h="370840">
                 <a:tc>
@@ -33790,6 +34577,11 @@
                   </a:txBody>
                   <a:tcPr/>
                 </a:tc>
+                <a:extLst>
+                  <a:ext uri="{0D108BD9-81ED-4DB2-BD59-A6C34878D82A}">
+                    <a16:rowId xmlns:a16="http://schemas.microsoft.com/office/drawing/2014/main" val="10004"/>
+                  </a:ext>
+                </a:extLst>
               </a:tr>
               <a:tr h="370840">
                 <a:tc>
@@ -33811,6 +34603,11 @@
                   </a:txBody>
                   <a:tcPr/>
                 </a:tc>
+                <a:extLst>
+                  <a:ext uri="{0D108BD9-81ED-4DB2-BD59-A6C34878D82A}">
+                    <a16:rowId xmlns:a16="http://schemas.microsoft.com/office/drawing/2014/main" val="10005"/>
+                  </a:ext>
+                </a:extLst>
               </a:tr>
             </a:tbl>
           </a:graphicData>
@@ -33841,7 +34638,13 @@
                 <a:tableStyleId>{5C22544A-7EE6-4342-B048-85BDC9FD1C3A}</a:tableStyleId>
               </a:tblPr>
               <a:tblGrid>
-                <a:gridCol w="2514600"/>
+                <a:gridCol w="2514600">
+                  <a:extLst>
+                    <a:ext uri="{9D8B030D-6E8A-4147-A177-3AD203B41FA5}">
+                      <a16:colId xmlns:a16="http://schemas.microsoft.com/office/drawing/2014/main" val="20000"/>
+                    </a:ext>
+                  </a:extLst>
+                </a:gridCol>
               </a:tblGrid>
               <a:tr h="370840">
                 <a:tc>
@@ -33859,6 +34662,11 @@
                   </a:txBody>
                   <a:tcPr/>
                 </a:tc>
+                <a:extLst>
+                  <a:ext uri="{0D108BD9-81ED-4DB2-BD59-A6C34878D82A}">
+                    <a16:rowId xmlns:a16="http://schemas.microsoft.com/office/drawing/2014/main" val="10000"/>
+                  </a:ext>
+                </a:extLst>
               </a:tr>
               <a:tr h="370840">
                 <a:tc>
@@ -33880,6 +34688,11 @@
                   </a:txBody>
                   <a:tcPr/>
                 </a:tc>
+                <a:extLst>
+                  <a:ext uri="{0D108BD9-81ED-4DB2-BD59-A6C34878D82A}">
+                    <a16:rowId xmlns:a16="http://schemas.microsoft.com/office/drawing/2014/main" val="10001"/>
+                  </a:ext>
+                </a:extLst>
               </a:tr>
             </a:tbl>
           </a:graphicData>
@@ -33910,12 +34723,48 @@
                 <a:tableStyleId>{5C22544A-7EE6-4342-B048-85BDC9FD1C3A}</a:tableStyleId>
               </a:tblPr>
               <a:tblGrid>
-                <a:gridCol w="393700"/>
-                <a:gridCol w="393700"/>
-                <a:gridCol w="393700"/>
-                <a:gridCol w="393700"/>
-                <a:gridCol w="393700"/>
-                <a:gridCol w="393700"/>
+                <a:gridCol w="393700">
+                  <a:extLst>
+                    <a:ext uri="{9D8B030D-6E8A-4147-A177-3AD203B41FA5}">
+                      <a16:colId xmlns:a16="http://schemas.microsoft.com/office/drawing/2014/main" val="20000"/>
+                    </a:ext>
+                  </a:extLst>
+                </a:gridCol>
+                <a:gridCol w="393700">
+                  <a:extLst>
+                    <a:ext uri="{9D8B030D-6E8A-4147-A177-3AD203B41FA5}">
+                      <a16:colId xmlns:a16="http://schemas.microsoft.com/office/drawing/2014/main" val="20001"/>
+                    </a:ext>
+                  </a:extLst>
+                </a:gridCol>
+                <a:gridCol w="393700">
+                  <a:extLst>
+                    <a:ext uri="{9D8B030D-6E8A-4147-A177-3AD203B41FA5}">
+                      <a16:colId xmlns:a16="http://schemas.microsoft.com/office/drawing/2014/main" val="20002"/>
+                    </a:ext>
+                  </a:extLst>
+                </a:gridCol>
+                <a:gridCol w="393700">
+                  <a:extLst>
+                    <a:ext uri="{9D8B030D-6E8A-4147-A177-3AD203B41FA5}">
+                      <a16:colId xmlns:a16="http://schemas.microsoft.com/office/drawing/2014/main" val="20003"/>
+                    </a:ext>
+                  </a:extLst>
+                </a:gridCol>
+                <a:gridCol w="393700">
+                  <a:extLst>
+                    <a:ext uri="{9D8B030D-6E8A-4147-A177-3AD203B41FA5}">
+                      <a16:colId xmlns:a16="http://schemas.microsoft.com/office/drawing/2014/main" val="20004"/>
+                    </a:ext>
+                  </a:extLst>
+                </a:gridCol>
+                <a:gridCol w="393700">
+                  <a:extLst>
+                    <a:ext uri="{9D8B030D-6E8A-4147-A177-3AD203B41FA5}">
+                      <a16:colId xmlns:a16="http://schemas.microsoft.com/office/drawing/2014/main" val="20005"/>
+                    </a:ext>
+                  </a:extLst>
+                </a:gridCol>
               </a:tblGrid>
               <a:tr h="370840">
                 <a:tc>
@@ -34002,6 +34851,11 @@
                     </a:solidFill>
                   </a:tcPr>
                 </a:tc>
+                <a:extLst>
+                  <a:ext uri="{0D108BD9-81ED-4DB2-BD59-A6C34878D82A}">
+                    <a16:rowId xmlns:a16="http://schemas.microsoft.com/office/drawing/2014/main" val="10000"/>
+                  </a:ext>
+                </a:extLst>
               </a:tr>
             </a:tbl>
           </a:graphicData>
@@ -34032,11 +34886,41 @@
                 <a:tableStyleId>{5C22544A-7EE6-4342-B048-85BDC9FD1C3A}</a:tableStyleId>
               </a:tblPr>
               <a:tblGrid>
-                <a:gridCol w="396240"/>
-                <a:gridCol w="396240"/>
-                <a:gridCol w="396240"/>
-                <a:gridCol w="396240"/>
-                <a:gridCol w="396240"/>
+                <a:gridCol w="396240">
+                  <a:extLst>
+                    <a:ext uri="{9D8B030D-6E8A-4147-A177-3AD203B41FA5}">
+                      <a16:colId xmlns:a16="http://schemas.microsoft.com/office/drawing/2014/main" val="20000"/>
+                    </a:ext>
+                  </a:extLst>
+                </a:gridCol>
+                <a:gridCol w="396240">
+                  <a:extLst>
+                    <a:ext uri="{9D8B030D-6E8A-4147-A177-3AD203B41FA5}">
+                      <a16:colId xmlns:a16="http://schemas.microsoft.com/office/drawing/2014/main" val="20001"/>
+                    </a:ext>
+                  </a:extLst>
+                </a:gridCol>
+                <a:gridCol w="396240">
+                  <a:extLst>
+                    <a:ext uri="{9D8B030D-6E8A-4147-A177-3AD203B41FA5}">
+                      <a16:colId xmlns:a16="http://schemas.microsoft.com/office/drawing/2014/main" val="20002"/>
+                    </a:ext>
+                  </a:extLst>
+                </a:gridCol>
+                <a:gridCol w="396240">
+                  <a:extLst>
+                    <a:ext uri="{9D8B030D-6E8A-4147-A177-3AD203B41FA5}">
+                      <a16:colId xmlns:a16="http://schemas.microsoft.com/office/drawing/2014/main" val="20003"/>
+                    </a:ext>
+                  </a:extLst>
+                </a:gridCol>
+                <a:gridCol w="396240">
+                  <a:extLst>
+                    <a:ext uri="{9D8B030D-6E8A-4147-A177-3AD203B41FA5}">
+                      <a16:colId xmlns:a16="http://schemas.microsoft.com/office/drawing/2014/main" val="20004"/>
+                    </a:ext>
+                  </a:extLst>
+                </a:gridCol>
               </a:tblGrid>
               <a:tr h="370840">
                 <a:tc>
@@ -34109,6 +34993,11 @@
                     </a:solidFill>
                   </a:tcPr>
                 </a:tc>
+                <a:extLst>
+                  <a:ext uri="{0D108BD9-81ED-4DB2-BD59-A6C34878D82A}">
+                    <a16:rowId xmlns:a16="http://schemas.microsoft.com/office/drawing/2014/main" val="10000"/>
+                  </a:ext>
+                </a:extLst>
               </a:tr>
             </a:tbl>
           </a:graphicData>
@@ -36585,7 +37474,7 @@
           <a:graphicData uri="http://schemas.openxmlformats.org/presentationml/2006/ole">
             <mc:AlternateContent xmlns:mc="http://schemas.openxmlformats.org/markup-compatibility/2006">
               <mc:Choice xmlns:v="urn:schemas-microsoft-com:vml" Requires="v">
-                <p:oleObj spid="_x0000_s23750" name="Equation" r:id="rId3" imgW="2641600" imgH="203200" progId="">
+                <p:oleObj spid="_x0000_s23756" name="Equation" r:id="rId3" imgW="2641600" imgH="203200" progId="">
                   <p:embed/>
                 </p:oleObj>
               </mc:Choice>
@@ -37254,8 +38143,20 @@
                 <a:tableStyleId>{5C22544A-7EE6-4342-B048-85BDC9FD1C3A}</a:tableStyleId>
               </a:tblPr>
               <a:tblGrid>
-                <a:gridCol w="1568768"/>
-                <a:gridCol w="3079433"/>
+                <a:gridCol w="1568768">
+                  <a:extLst>
+                    <a:ext uri="{9D8B030D-6E8A-4147-A177-3AD203B41FA5}">
+                      <a16:colId xmlns:a16="http://schemas.microsoft.com/office/drawing/2014/main" val="20000"/>
+                    </a:ext>
+                  </a:extLst>
+                </a:gridCol>
+                <a:gridCol w="3079433">
+                  <a:extLst>
+                    <a:ext uri="{9D8B030D-6E8A-4147-A177-3AD203B41FA5}">
+                      <a16:colId xmlns:a16="http://schemas.microsoft.com/office/drawing/2014/main" val="20001"/>
+                    </a:ext>
+                  </a:extLst>
+                </a:gridCol>
               </a:tblGrid>
               <a:tr h="370840">
                 <a:tc>
@@ -37288,6 +38189,11 @@
                   </a:txBody>
                   <a:tcPr anchor="ctr"/>
                 </a:tc>
+                <a:extLst>
+                  <a:ext uri="{0D108BD9-81ED-4DB2-BD59-A6C34878D82A}">
+                    <a16:rowId xmlns:a16="http://schemas.microsoft.com/office/drawing/2014/main" val="10000"/>
+                  </a:ext>
+                </a:extLst>
               </a:tr>
               <a:tr h="370840">
                 <a:tc>
@@ -37320,6 +38226,11 @@
                   </a:txBody>
                   <a:tcPr anchor="ctr"/>
                 </a:tc>
+                <a:extLst>
+                  <a:ext uri="{0D108BD9-81ED-4DB2-BD59-A6C34878D82A}">
+                    <a16:rowId xmlns:a16="http://schemas.microsoft.com/office/drawing/2014/main" val="10001"/>
+                  </a:ext>
+                </a:extLst>
               </a:tr>
               <a:tr h="370840">
                 <a:tc>
@@ -37352,6 +38263,11 @@
                   </a:txBody>
                   <a:tcPr anchor="ctr"/>
                 </a:tc>
+                <a:extLst>
+                  <a:ext uri="{0D108BD9-81ED-4DB2-BD59-A6C34878D82A}">
+                    <a16:rowId xmlns:a16="http://schemas.microsoft.com/office/drawing/2014/main" val="10002"/>
+                  </a:ext>
+                </a:extLst>
               </a:tr>
               <a:tr h="370840">
                 <a:tc>
@@ -37384,6 +38300,11 @@
                   </a:txBody>
                   <a:tcPr anchor="ctr"/>
                 </a:tc>
+                <a:extLst>
+                  <a:ext uri="{0D108BD9-81ED-4DB2-BD59-A6C34878D82A}">
+                    <a16:rowId xmlns:a16="http://schemas.microsoft.com/office/drawing/2014/main" val="10003"/>
+                  </a:ext>
+                </a:extLst>
               </a:tr>
               <a:tr h="370840">
                 <a:tc>
@@ -37416,6 +38337,11 @@
                   </a:txBody>
                   <a:tcPr anchor="ctr"/>
                 </a:tc>
+                <a:extLst>
+                  <a:ext uri="{0D108BD9-81ED-4DB2-BD59-A6C34878D82A}">
+                    <a16:rowId xmlns:a16="http://schemas.microsoft.com/office/drawing/2014/main" val="10004"/>
+                  </a:ext>
+                </a:extLst>
               </a:tr>
               <a:tr h="370840">
                 <a:tc>
@@ -37452,6 +38378,11 @@
                   </a:txBody>
                   <a:tcPr anchor="ctr"/>
                 </a:tc>
+                <a:extLst>
+                  <a:ext uri="{0D108BD9-81ED-4DB2-BD59-A6C34878D82A}">
+                    <a16:rowId xmlns:a16="http://schemas.microsoft.com/office/drawing/2014/main" val="10005"/>
+                  </a:ext>
+                </a:extLst>
               </a:tr>
               <a:tr h="370840">
                 <a:tc>
@@ -37484,6 +38415,11 @@
                   </a:txBody>
                   <a:tcPr anchor="ctr"/>
                 </a:tc>
+                <a:extLst>
+                  <a:ext uri="{0D108BD9-81ED-4DB2-BD59-A6C34878D82A}">
+                    <a16:rowId xmlns:a16="http://schemas.microsoft.com/office/drawing/2014/main" val="10006"/>
+                  </a:ext>
+                </a:extLst>
               </a:tr>
               <a:tr h="370840">
                 <a:tc>
@@ -37516,6 +38452,11 @@
                   </a:txBody>
                   <a:tcPr anchor="ctr"/>
                 </a:tc>
+                <a:extLst>
+                  <a:ext uri="{0D108BD9-81ED-4DB2-BD59-A6C34878D82A}">
+                    <a16:rowId xmlns:a16="http://schemas.microsoft.com/office/drawing/2014/main" val="10007"/>
+                  </a:ext>
+                </a:extLst>
               </a:tr>
               <a:tr h="370840">
                 <a:tc>
@@ -37548,6 +38489,11 @@
                   </a:txBody>
                   <a:tcPr anchor="ctr"/>
                 </a:tc>
+                <a:extLst>
+                  <a:ext uri="{0D108BD9-81ED-4DB2-BD59-A6C34878D82A}">
+                    <a16:rowId xmlns:a16="http://schemas.microsoft.com/office/drawing/2014/main" val="10008"/>
+                  </a:ext>
+                </a:extLst>
               </a:tr>
             </a:tbl>
           </a:graphicData>
@@ -37961,7 +38907,7 @@
                         <m:dPr>
                           <m:ctrlPr>
                             <a:rPr lang="en-US" altLang="zh-CN" sz="3300" b="0" i="1" smtClean="0">
-                              <a:latin typeface="Cambria Math"/>
+                              <a:latin typeface="Cambria Math" panose="02040503050406030204" pitchFamily="18" charset="0"/>
                             </a:rPr>
                           </m:ctrlPr>
                         </m:dPr>
@@ -37984,7 +38930,7 @@
                         <m:fPr>
                           <m:ctrlPr>
                             <a:rPr lang="en-US" altLang="zh-CN" sz="3300" b="0" i="1" smtClean="0">
-                              <a:latin typeface="Cambria Math"/>
+                              <a:latin typeface="Cambria Math" panose="02040503050406030204" pitchFamily="18" charset="0"/>
                             </a:rPr>
                           </m:ctrlPr>
                         </m:fPr>
@@ -38111,10 +39057,34 @@
                 <a:tableStyleId>{5C22544A-7EE6-4342-B048-85BDC9FD1C3A}</a:tableStyleId>
               </a:tblPr>
               <a:tblGrid>
-                <a:gridCol w="1320075"/>
-                <a:gridCol w="1397726"/>
-                <a:gridCol w="4216400"/>
-                <a:gridCol w="1219200"/>
+                <a:gridCol w="1320075">
+                  <a:extLst>
+                    <a:ext uri="{9D8B030D-6E8A-4147-A177-3AD203B41FA5}">
+                      <a16:colId xmlns:a16="http://schemas.microsoft.com/office/drawing/2014/main" val="20000"/>
+                    </a:ext>
+                  </a:extLst>
+                </a:gridCol>
+                <a:gridCol w="1397726">
+                  <a:extLst>
+                    <a:ext uri="{9D8B030D-6E8A-4147-A177-3AD203B41FA5}">
+                      <a16:colId xmlns:a16="http://schemas.microsoft.com/office/drawing/2014/main" val="20001"/>
+                    </a:ext>
+                  </a:extLst>
+                </a:gridCol>
+                <a:gridCol w="4216400">
+                  <a:extLst>
+                    <a:ext uri="{9D8B030D-6E8A-4147-A177-3AD203B41FA5}">
+                      <a16:colId xmlns:a16="http://schemas.microsoft.com/office/drawing/2014/main" val="20002"/>
+                    </a:ext>
+                  </a:extLst>
+                </a:gridCol>
+                <a:gridCol w="1219200">
+                  <a:extLst>
+                    <a:ext uri="{9D8B030D-6E8A-4147-A177-3AD203B41FA5}">
+                      <a16:colId xmlns:a16="http://schemas.microsoft.com/office/drawing/2014/main" val="20003"/>
+                    </a:ext>
+                  </a:extLst>
+                </a:gridCol>
               </a:tblGrid>
               <a:tr h="349808">
                 <a:tc>
@@ -38177,6 +39147,11 @@
                   </a:txBody>
                   <a:tcPr anchor="ctr"/>
                 </a:tc>
+                <a:extLst>
+                  <a:ext uri="{0D108BD9-81ED-4DB2-BD59-A6C34878D82A}">
+                    <a16:rowId xmlns:a16="http://schemas.microsoft.com/office/drawing/2014/main" val="10000"/>
+                  </a:ext>
+                </a:extLst>
               </a:tr>
               <a:tr h="349808">
                 <a:tc>
@@ -38253,6 +39228,11 @@
                   </a:txBody>
                   <a:tcPr anchor="ctr"/>
                 </a:tc>
+                <a:extLst>
+                  <a:ext uri="{0D108BD9-81ED-4DB2-BD59-A6C34878D82A}">
+                    <a16:rowId xmlns:a16="http://schemas.microsoft.com/office/drawing/2014/main" val="10001"/>
+                  </a:ext>
+                </a:extLst>
               </a:tr>
               <a:tr h="349808">
                 <a:tc>
@@ -38322,6 +39302,11 @@
                   </a:txBody>
                   <a:tcPr anchor="ctr"/>
                 </a:tc>
+                <a:extLst>
+                  <a:ext uri="{0D108BD9-81ED-4DB2-BD59-A6C34878D82A}">
+                    <a16:rowId xmlns:a16="http://schemas.microsoft.com/office/drawing/2014/main" val="10002"/>
+                  </a:ext>
+                </a:extLst>
               </a:tr>
               <a:tr h="320657">
                 <a:tc>
@@ -38415,6 +39400,11 @@
                   </a:txBody>
                   <a:tcPr anchor="ctr"/>
                 </a:tc>
+                <a:extLst>
+                  <a:ext uri="{0D108BD9-81ED-4DB2-BD59-A6C34878D82A}">
+                    <a16:rowId xmlns:a16="http://schemas.microsoft.com/office/drawing/2014/main" val="10003"/>
+                  </a:ext>
+                </a:extLst>
               </a:tr>
               <a:tr h="349808">
                 <a:tc>
@@ -38484,6 +39474,11 @@
                   </a:txBody>
                   <a:tcPr anchor="ctr"/>
                 </a:tc>
+                <a:extLst>
+                  <a:ext uri="{0D108BD9-81ED-4DB2-BD59-A6C34878D82A}">
+                    <a16:rowId xmlns:a16="http://schemas.microsoft.com/office/drawing/2014/main" val="10004"/>
+                  </a:ext>
+                </a:extLst>
               </a:tr>
               <a:tr h="349808">
                 <a:tc>
@@ -38560,6 +39555,11 @@
                   </a:txBody>
                   <a:tcPr anchor="ctr"/>
                 </a:tc>
+                <a:extLst>
+                  <a:ext uri="{0D108BD9-81ED-4DB2-BD59-A6C34878D82A}">
+                    <a16:rowId xmlns:a16="http://schemas.microsoft.com/office/drawing/2014/main" val="10005"/>
+                  </a:ext>
+                </a:extLst>
               </a:tr>
               <a:tr h="349808">
                 <a:tc>
@@ -38646,6 +39646,11 @@
                   </a:txBody>
                   <a:tcPr anchor="ctr"/>
                 </a:tc>
+                <a:extLst>
+                  <a:ext uri="{0D108BD9-81ED-4DB2-BD59-A6C34878D82A}">
+                    <a16:rowId xmlns:a16="http://schemas.microsoft.com/office/drawing/2014/main" val="10006"/>
+                  </a:ext>
+                </a:extLst>
               </a:tr>
               <a:tr h="349808">
                 <a:tc>
@@ -38710,6 +39715,11 @@
                   </a:txBody>
                   <a:tcPr anchor="ctr"/>
                 </a:tc>
+                <a:extLst>
+                  <a:ext uri="{0D108BD9-81ED-4DB2-BD59-A6C34878D82A}">
+                    <a16:rowId xmlns:a16="http://schemas.microsoft.com/office/drawing/2014/main" val="10007"/>
+                  </a:ext>
+                </a:extLst>
               </a:tr>
               <a:tr h="349808">
                 <a:tc>
@@ -38763,6 +39773,11 @@
                   </a:txBody>
                   <a:tcPr anchor="ctr"/>
                 </a:tc>
+                <a:extLst>
+                  <a:ext uri="{0D108BD9-81ED-4DB2-BD59-A6C34878D82A}">
+                    <a16:rowId xmlns:a16="http://schemas.microsoft.com/office/drawing/2014/main" val="10008"/>
+                  </a:ext>
+                </a:extLst>
               </a:tr>
               <a:tr h="396240">
                 <a:tc>
@@ -38844,6 +39859,11 @@
                   </a:txBody>
                   <a:tcPr anchor="ctr"/>
                 </a:tc>
+                <a:extLst>
+                  <a:ext uri="{0D108BD9-81ED-4DB2-BD59-A6C34878D82A}">
+                    <a16:rowId xmlns:a16="http://schemas.microsoft.com/office/drawing/2014/main" val="10009"/>
+                  </a:ext>
+                </a:extLst>
               </a:tr>
             </a:tbl>
           </a:graphicData>
@@ -39077,7 +40097,7 @@
                         <m:dPr>
                           <m:ctrlPr>
                             <a:rPr lang="en-US" altLang="zh-CN" i="1">
-                              <a:latin typeface="Cambria Math"/>
+                              <a:latin typeface="Cambria Math" panose="02040503050406030204" pitchFamily="18" charset="0"/>
                             </a:rPr>
                           </m:ctrlPr>
                         </m:dPr>
@@ -39114,7 +40134,7 @@
                         <m:fPr>
                           <m:ctrlPr>
                             <a:rPr lang="en-US" altLang="zh-CN" i="1">
-                              <a:latin typeface="Cambria Math"/>
+                              <a:latin typeface="Cambria Math" panose="02040503050406030204" pitchFamily="18" charset="0"/>
                             </a:rPr>
                           </m:ctrlPr>
                         </m:fPr>
@@ -39234,7 +40254,7 @@
                         <m:dPr>
                           <m:ctrlPr>
                             <a:rPr lang="en-US" altLang="zh-CN" i="1">
-                              <a:latin typeface="Cambria Math"/>
+                              <a:latin typeface="Cambria Math" panose="02040503050406030204" pitchFamily="18" charset="0"/>
                             </a:rPr>
                           </m:ctrlPr>
                         </m:dPr>
@@ -39271,7 +40291,7 @@
                         <m:fPr>
                           <m:ctrlPr>
                             <a:rPr lang="en-US" altLang="zh-CN" i="1">
-                              <a:latin typeface="Cambria Math"/>
+                              <a:latin typeface="Cambria Math" panose="02040503050406030204" pitchFamily="18" charset="0"/>
                             </a:rPr>
                           </m:ctrlPr>
                         </m:fPr>
@@ -39389,7 +40409,7 @@
                         <m:dPr>
                           <m:ctrlPr>
                             <a:rPr lang="en-US" altLang="zh-CN" b="0" i="1" smtClean="0">
-                              <a:latin typeface="Cambria Math"/>
+                              <a:latin typeface="Cambria Math" panose="02040503050406030204" pitchFamily="18" charset="0"/>
                             </a:rPr>
                           </m:ctrlPr>
                         </m:dPr>
@@ -39426,7 +40446,7 @@
                         <m:fPr>
                           <m:ctrlPr>
                             <a:rPr lang="en-US" altLang="zh-CN" b="0" i="1" smtClean="0">
-                              <a:latin typeface="Cambria Math"/>
+                              <a:latin typeface="Cambria Math" panose="02040503050406030204" pitchFamily="18" charset="0"/>
                             </a:rPr>
                           </m:ctrlPr>
                         </m:fPr>

</xml_diff>